<commit_message>
update 5507 course number and vagrant info
</commit_message>
<xml_diff>
--- a/VM_instructions.pptx
+++ b/VM_instructions.pptx
@@ -4,6 +4,9 @@
   <p:sldMasterIdLst>
     <p:sldMasterId id="2147483888" r:id="rId4"/>
   </p:sldMasterIdLst>
+  <p:notesMasterIdLst>
+    <p:notesMasterId r:id="rId16"/>
+  </p:notesMasterIdLst>
   <p:sldIdLst>
     <p:sldId id="256" r:id="rId5"/>
     <p:sldId id="257" r:id="rId6"/>
@@ -14,6 +17,8 @@
     <p:sldId id="262" r:id="rId11"/>
     <p:sldId id="263" r:id="rId12"/>
     <p:sldId id="264" r:id="rId13"/>
+    <p:sldId id="265" r:id="rId14"/>
+    <p:sldId id="266" r:id="rId15"/>
   </p:sldIdLst>
   <p:sldSz cx="12192000" cy="6858000"/>
   <p:notesSz cx="6858000" cy="9144000"/>
@@ -120,6 +125,356 @@
 </p:presentation>
 </file>
 
+<file path=ppt/notesMasters/notesMaster1.xml><?xml version="1.0" encoding="utf-8"?>
+<p:notesMaster xmlns:a="http://schemas.openxmlformats.org/drawingml/2006/main" xmlns:r="http://schemas.openxmlformats.org/officeDocument/2006/relationships" xmlns:p="http://schemas.openxmlformats.org/presentationml/2006/main">
+  <p:cSld>
+    <p:bg>
+      <p:bgRef idx="1001">
+        <a:schemeClr val="bg1"/>
+      </p:bgRef>
+    </p:bg>
+    <p:spTree>
+      <p:nvGrpSpPr>
+        <p:cNvPr id="1" name=""/>
+        <p:cNvGrpSpPr/>
+        <p:nvPr/>
+      </p:nvGrpSpPr>
+      <p:grpSpPr>
+        <a:xfrm>
+          <a:off x="0" y="0"/>
+          <a:ext cx="0" cy="0"/>
+          <a:chOff x="0" y="0"/>
+          <a:chExt cx="0" cy="0"/>
+        </a:xfrm>
+      </p:grpSpPr>
+      <p:sp>
+        <p:nvSpPr>
+          <p:cNvPr id="2" name="Header Placeholder 1"/>
+          <p:cNvSpPr>
+            <a:spLocks noGrp="1"/>
+          </p:cNvSpPr>
+          <p:nvPr>
+            <p:ph type="hdr" sz="quarter"/>
+          </p:nvPr>
+        </p:nvSpPr>
+        <p:spPr>
+          <a:xfrm>
+            <a:off x="0" y="0"/>
+            <a:ext cx="2971800" cy="458788"/>
+          </a:xfrm>
+          <a:prstGeom prst="rect">
+            <a:avLst/>
+          </a:prstGeom>
+        </p:spPr>
+        <p:txBody>
+          <a:bodyPr vert="horz" lIns="91440" tIns="45720" rIns="91440" bIns="45720" rtlCol="0"/>
+          <a:lstStyle>
+            <a:lvl1pPr algn="l">
+              <a:defRPr sz="1200"/>
+            </a:lvl1pPr>
+          </a:lstStyle>
+          <a:p>
+            <a:endParaRPr lang="en-AU"/>
+          </a:p>
+        </p:txBody>
+      </p:sp>
+      <p:sp>
+        <p:nvSpPr>
+          <p:cNvPr id="3" name="Date Placeholder 2"/>
+          <p:cNvSpPr>
+            <a:spLocks noGrp="1"/>
+          </p:cNvSpPr>
+          <p:nvPr>
+            <p:ph type="dt" idx="1"/>
+          </p:nvPr>
+        </p:nvSpPr>
+        <p:spPr>
+          <a:xfrm>
+            <a:off x="3884613" y="0"/>
+            <a:ext cx="2971800" cy="458788"/>
+          </a:xfrm>
+          <a:prstGeom prst="rect">
+            <a:avLst/>
+          </a:prstGeom>
+        </p:spPr>
+        <p:txBody>
+          <a:bodyPr vert="horz" lIns="91440" tIns="45720" rIns="91440" bIns="45720" rtlCol="0"/>
+          <a:lstStyle>
+            <a:lvl1pPr algn="r">
+              <a:defRPr sz="1200"/>
+            </a:lvl1pPr>
+          </a:lstStyle>
+          <a:p>
+            <a:fld id="{E23ADF96-BC0D-4C55-91BC-EF02308C332B}" type="datetimeFigureOut">
+              <a:rPr lang="en-AU" smtClean="0"/>
+              <a:t>4/08/2020</a:t>
+            </a:fld>
+            <a:endParaRPr lang="en-AU"/>
+          </a:p>
+        </p:txBody>
+      </p:sp>
+      <p:sp>
+        <p:nvSpPr>
+          <p:cNvPr id="4" name="Slide Image Placeholder 3"/>
+          <p:cNvSpPr>
+            <a:spLocks noGrp="1" noRot="1" noChangeAspect="1"/>
+          </p:cNvSpPr>
+          <p:nvPr>
+            <p:ph type="sldImg" idx="2"/>
+          </p:nvPr>
+        </p:nvSpPr>
+        <p:spPr>
+          <a:xfrm>
+            <a:off x="685800" y="1143000"/>
+            <a:ext cx="5486400" cy="3086100"/>
+          </a:xfrm>
+          <a:prstGeom prst="rect">
+            <a:avLst/>
+          </a:prstGeom>
+          <a:noFill/>
+          <a:ln w="12700">
+            <a:solidFill>
+              <a:prstClr val="black"/>
+            </a:solidFill>
+          </a:ln>
+        </p:spPr>
+        <p:txBody>
+          <a:bodyPr vert="horz" lIns="91440" tIns="45720" rIns="91440" bIns="45720" rtlCol="0" anchor="ctr"/>
+          <a:lstStyle/>
+          <a:p>
+            <a:endParaRPr lang="en-AU"/>
+          </a:p>
+        </p:txBody>
+      </p:sp>
+      <p:sp>
+        <p:nvSpPr>
+          <p:cNvPr id="5" name="Notes Placeholder 4"/>
+          <p:cNvSpPr>
+            <a:spLocks noGrp="1"/>
+          </p:cNvSpPr>
+          <p:nvPr>
+            <p:ph type="body" sz="quarter" idx="3"/>
+          </p:nvPr>
+        </p:nvSpPr>
+        <p:spPr>
+          <a:xfrm>
+            <a:off x="685800" y="4400550"/>
+            <a:ext cx="5486400" cy="3600450"/>
+          </a:xfrm>
+          <a:prstGeom prst="rect">
+            <a:avLst/>
+          </a:prstGeom>
+        </p:spPr>
+        <p:txBody>
+          <a:bodyPr vert="horz" lIns="91440" tIns="45720" rIns="91440" bIns="45720" rtlCol="0"/>
+          <a:lstStyle/>
+          <a:p>
+            <a:pPr lvl="0"/>
+            <a:r>
+              <a:rPr lang="en-US" smtClean="0"/>
+              <a:t>Edit Master text styles</a:t>
+            </a:r>
+          </a:p>
+          <a:p>
+            <a:pPr lvl="1"/>
+            <a:r>
+              <a:rPr lang="en-US" smtClean="0"/>
+              <a:t>Second level</a:t>
+            </a:r>
+          </a:p>
+          <a:p>
+            <a:pPr lvl="2"/>
+            <a:r>
+              <a:rPr lang="en-US" smtClean="0"/>
+              <a:t>Third level</a:t>
+            </a:r>
+          </a:p>
+          <a:p>
+            <a:pPr lvl="3"/>
+            <a:r>
+              <a:rPr lang="en-US" smtClean="0"/>
+              <a:t>Fourth level</a:t>
+            </a:r>
+          </a:p>
+          <a:p>
+            <a:pPr lvl="4"/>
+            <a:r>
+              <a:rPr lang="en-US" smtClean="0"/>
+              <a:t>Fifth level</a:t>
+            </a:r>
+            <a:endParaRPr lang="en-AU"/>
+          </a:p>
+        </p:txBody>
+      </p:sp>
+      <p:sp>
+        <p:nvSpPr>
+          <p:cNvPr id="6" name="Footer Placeholder 5"/>
+          <p:cNvSpPr>
+            <a:spLocks noGrp="1"/>
+          </p:cNvSpPr>
+          <p:nvPr>
+            <p:ph type="ftr" sz="quarter" idx="4"/>
+          </p:nvPr>
+        </p:nvSpPr>
+        <p:spPr>
+          <a:xfrm>
+            <a:off x="0" y="8685213"/>
+            <a:ext cx="2971800" cy="458787"/>
+          </a:xfrm>
+          <a:prstGeom prst="rect">
+            <a:avLst/>
+          </a:prstGeom>
+        </p:spPr>
+        <p:txBody>
+          <a:bodyPr vert="horz" lIns="91440" tIns="45720" rIns="91440" bIns="45720" rtlCol="0" anchor="b"/>
+          <a:lstStyle>
+            <a:lvl1pPr algn="l">
+              <a:defRPr sz="1200"/>
+            </a:lvl1pPr>
+          </a:lstStyle>
+          <a:p>
+            <a:endParaRPr lang="en-AU"/>
+          </a:p>
+        </p:txBody>
+      </p:sp>
+      <p:sp>
+        <p:nvSpPr>
+          <p:cNvPr id="7" name="Slide Number Placeholder 6"/>
+          <p:cNvSpPr>
+            <a:spLocks noGrp="1"/>
+          </p:cNvSpPr>
+          <p:nvPr>
+            <p:ph type="sldNum" sz="quarter" idx="5"/>
+          </p:nvPr>
+        </p:nvSpPr>
+        <p:spPr>
+          <a:xfrm>
+            <a:off x="3884613" y="8685213"/>
+            <a:ext cx="2971800" cy="458787"/>
+          </a:xfrm>
+          <a:prstGeom prst="rect">
+            <a:avLst/>
+          </a:prstGeom>
+        </p:spPr>
+        <p:txBody>
+          <a:bodyPr vert="horz" lIns="91440" tIns="45720" rIns="91440" bIns="45720" rtlCol="0" anchor="b"/>
+          <a:lstStyle>
+            <a:lvl1pPr algn="r">
+              <a:defRPr sz="1200"/>
+            </a:lvl1pPr>
+          </a:lstStyle>
+          <a:p>
+            <a:fld id="{641B2673-FB40-43A5-95B2-DD9A915B89EA}" type="slidenum">
+              <a:rPr lang="en-AU" smtClean="0"/>
+              <a:t>‹#›</a:t>
+            </a:fld>
+            <a:endParaRPr lang="en-AU"/>
+          </a:p>
+        </p:txBody>
+      </p:sp>
+    </p:spTree>
+    <p:extLst>
+      <p:ext uri="{BB962C8B-B14F-4D97-AF65-F5344CB8AC3E}">
+        <p14:creationId xmlns:p14="http://schemas.microsoft.com/office/powerpoint/2010/main" val="4067424455"/>
+      </p:ext>
+    </p:extLst>
+  </p:cSld>
+  <p:clrMap bg1="lt1" tx1="dk1" bg2="lt2" tx2="dk2" accent1="accent1" accent2="accent2" accent3="accent3" accent4="accent4" accent5="accent5" accent6="accent6" hlink="hlink" folHlink="folHlink"/>
+  <p:notesStyle>
+    <a:lvl1pPr marL="0" algn="l" defTabSz="914400" rtl="0" eaLnBrk="1" latinLnBrk="0" hangingPunct="1">
+      <a:defRPr sz="1200" kern="1200">
+        <a:solidFill>
+          <a:schemeClr val="tx1"/>
+        </a:solidFill>
+        <a:latin typeface="+mn-lt"/>
+        <a:ea typeface="+mn-ea"/>
+        <a:cs typeface="+mn-cs"/>
+      </a:defRPr>
+    </a:lvl1pPr>
+    <a:lvl2pPr marL="457200" algn="l" defTabSz="914400" rtl="0" eaLnBrk="1" latinLnBrk="0" hangingPunct="1">
+      <a:defRPr sz="1200" kern="1200">
+        <a:solidFill>
+          <a:schemeClr val="tx1"/>
+        </a:solidFill>
+        <a:latin typeface="+mn-lt"/>
+        <a:ea typeface="+mn-ea"/>
+        <a:cs typeface="+mn-cs"/>
+      </a:defRPr>
+    </a:lvl2pPr>
+    <a:lvl3pPr marL="914400" algn="l" defTabSz="914400" rtl="0" eaLnBrk="1" latinLnBrk="0" hangingPunct="1">
+      <a:defRPr sz="1200" kern="1200">
+        <a:solidFill>
+          <a:schemeClr val="tx1"/>
+        </a:solidFill>
+        <a:latin typeface="+mn-lt"/>
+        <a:ea typeface="+mn-ea"/>
+        <a:cs typeface="+mn-cs"/>
+      </a:defRPr>
+    </a:lvl3pPr>
+    <a:lvl4pPr marL="1371600" algn="l" defTabSz="914400" rtl="0" eaLnBrk="1" latinLnBrk="0" hangingPunct="1">
+      <a:defRPr sz="1200" kern="1200">
+        <a:solidFill>
+          <a:schemeClr val="tx1"/>
+        </a:solidFill>
+        <a:latin typeface="+mn-lt"/>
+        <a:ea typeface="+mn-ea"/>
+        <a:cs typeface="+mn-cs"/>
+      </a:defRPr>
+    </a:lvl4pPr>
+    <a:lvl5pPr marL="1828800" algn="l" defTabSz="914400" rtl="0" eaLnBrk="1" latinLnBrk="0" hangingPunct="1">
+      <a:defRPr sz="1200" kern="1200">
+        <a:solidFill>
+          <a:schemeClr val="tx1"/>
+        </a:solidFill>
+        <a:latin typeface="+mn-lt"/>
+        <a:ea typeface="+mn-ea"/>
+        <a:cs typeface="+mn-cs"/>
+      </a:defRPr>
+    </a:lvl5pPr>
+    <a:lvl6pPr marL="2286000" algn="l" defTabSz="914400" rtl="0" eaLnBrk="1" latinLnBrk="0" hangingPunct="1">
+      <a:defRPr sz="1200" kern="1200">
+        <a:solidFill>
+          <a:schemeClr val="tx1"/>
+        </a:solidFill>
+        <a:latin typeface="+mn-lt"/>
+        <a:ea typeface="+mn-ea"/>
+        <a:cs typeface="+mn-cs"/>
+      </a:defRPr>
+    </a:lvl6pPr>
+    <a:lvl7pPr marL="2743200" algn="l" defTabSz="914400" rtl="0" eaLnBrk="1" latinLnBrk="0" hangingPunct="1">
+      <a:defRPr sz="1200" kern="1200">
+        <a:solidFill>
+          <a:schemeClr val="tx1"/>
+        </a:solidFill>
+        <a:latin typeface="+mn-lt"/>
+        <a:ea typeface="+mn-ea"/>
+        <a:cs typeface="+mn-cs"/>
+      </a:defRPr>
+    </a:lvl7pPr>
+    <a:lvl8pPr marL="3200400" algn="l" defTabSz="914400" rtl="0" eaLnBrk="1" latinLnBrk="0" hangingPunct="1">
+      <a:defRPr sz="1200" kern="1200">
+        <a:solidFill>
+          <a:schemeClr val="tx1"/>
+        </a:solidFill>
+        <a:latin typeface="+mn-lt"/>
+        <a:ea typeface="+mn-ea"/>
+        <a:cs typeface="+mn-cs"/>
+      </a:defRPr>
+    </a:lvl8pPr>
+    <a:lvl9pPr marL="3657600" algn="l" defTabSz="914400" rtl="0" eaLnBrk="1" latinLnBrk="0" hangingPunct="1">
+      <a:defRPr sz="1200" kern="1200">
+        <a:solidFill>
+          <a:schemeClr val="tx1"/>
+        </a:solidFill>
+        <a:latin typeface="+mn-lt"/>
+        <a:ea typeface="+mn-ea"/>
+        <a:cs typeface="+mn-cs"/>
+      </a:defRPr>
+    </a:lvl9pPr>
+  </p:notesStyle>
+</p:notesMaster>
+</file>
+
 <file path=ppt/slideLayouts/slideLayout1.xml><?xml version="1.0" encoding="utf-8"?>
 <p:sldLayout xmlns:a="http://schemas.openxmlformats.org/drawingml/2006/main" xmlns:r="http://schemas.openxmlformats.org/officeDocument/2006/relationships" xmlns:p="http://schemas.openxmlformats.org/presentationml/2006/main" type="title" preserve="1">
   <p:cSld name="Title Slide">
@@ -291,7 +646,7 @@
           <a:p>
             <a:fld id="{A97D098C-81A2-4741-849D-B3F04101F1CD}" type="datetimeFigureOut">
               <a:rPr lang="en-AU" smtClean="0"/>
-              <a:t>3/08/2020</a:t>
+              <a:t>4/08/2020</a:t>
             </a:fld>
             <a:endParaRPr lang="en-AU"/>
           </a:p>
@@ -606,7 +961,7 @@
           <a:p>
             <a:fld id="{A97D098C-81A2-4741-849D-B3F04101F1CD}" type="datetimeFigureOut">
               <a:rPr lang="en-AU" smtClean="0"/>
-              <a:t>3/08/2020</a:t>
+              <a:t>4/08/2020</a:t>
             </a:fld>
             <a:endParaRPr lang="en-AU"/>
           </a:p>
@@ -828,7 +1183,7 @@
           <a:p>
             <a:fld id="{A97D098C-81A2-4741-849D-B3F04101F1CD}" type="datetimeFigureOut">
               <a:rPr lang="en-AU" smtClean="0"/>
-              <a:t>3/08/2020</a:t>
+              <a:t>4/08/2020</a:t>
             </a:fld>
             <a:endParaRPr lang="en-AU"/>
           </a:p>
@@ -1119,7 +1474,7 @@
           <a:p>
             <a:fld id="{A97D098C-81A2-4741-849D-B3F04101F1CD}" type="datetimeFigureOut">
               <a:rPr lang="en-AU" smtClean="0"/>
-              <a:t>3/08/2020</a:t>
+              <a:t>4/08/2020</a:t>
             </a:fld>
             <a:endParaRPr lang="en-AU"/>
           </a:p>
@@ -1573,7 +1928,7 @@
           <a:p>
             <a:fld id="{A97D098C-81A2-4741-849D-B3F04101F1CD}" type="datetimeFigureOut">
               <a:rPr lang="en-AU" smtClean="0"/>
-              <a:t>3/08/2020</a:t>
+              <a:t>4/08/2020</a:t>
             </a:fld>
             <a:endParaRPr lang="en-AU"/>
           </a:p>
@@ -2149,7 +2504,7 @@
           <a:p>
             <a:fld id="{A97D098C-81A2-4741-849D-B3F04101F1CD}" type="datetimeFigureOut">
               <a:rPr lang="en-AU" smtClean="0"/>
-              <a:t>3/08/2020</a:t>
+              <a:t>4/08/2020</a:t>
             </a:fld>
             <a:endParaRPr lang="en-AU"/>
           </a:p>
@@ -3010,7 +3365,7 @@
           <a:p>
             <a:fld id="{A97D098C-81A2-4741-849D-B3F04101F1CD}" type="datetimeFigureOut">
               <a:rPr lang="en-AU" smtClean="0"/>
-              <a:t>3/08/2020</a:t>
+              <a:t>4/08/2020</a:t>
             </a:fld>
             <a:endParaRPr lang="en-AU"/>
           </a:p>
@@ -3215,7 +3570,7 @@
           <a:p>
             <a:fld id="{A97D098C-81A2-4741-849D-B3F04101F1CD}" type="datetimeFigureOut">
               <a:rPr lang="en-AU" smtClean="0"/>
-              <a:t>3/08/2020</a:t>
+              <a:t>4/08/2020</a:t>
             </a:fld>
             <a:endParaRPr lang="en-AU"/>
           </a:p>
@@ -3429,7 +3784,7 @@
           <a:p>
             <a:fld id="{A97D098C-81A2-4741-849D-B3F04101F1CD}" type="datetimeFigureOut">
               <a:rPr lang="en-AU" smtClean="0"/>
-              <a:t>3/08/2020</a:t>
+              <a:t>4/08/2020</a:t>
             </a:fld>
             <a:endParaRPr lang="en-AU"/>
           </a:p>
@@ -3634,7 +3989,7 @@
           <a:p>
             <a:fld id="{A97D098C-81A2-4741-849D-B3F04101F1CD}" type="datetimeFigureOut">
               <a:rPr lang="en-AU" smtClean="0"/>
-              <a:t>3/08/2020</a:t>
+              <a:t>4/08/2020</a:t>
             </a:fld>
             <a:endParaRPr lang="en-AU"/>
           </a:p>
@@ -3914,7 +4269,7 @@
           <a:p>
             <a:fld id="{A97D098C-81A2-4741-849D-B3F04101F1CD}" type="datetimeFigureOut">
               <a:rPr lang="en-AU" smtClean="0"/>
-              <a:t>3/08/2020</a:t>
+              <a:t>4/08/2020</a:t>
             </a:fld>
             <a:endParaRPr lang="en-AU"/>
           </a:p>
@@ -4181,7 +4536,7 @@
           <a:p>
             <a:fld id="{A97D098C-81A2-4741-849D-B3F04101F1CD}" type="datetimeFigureOut">
               <a:rPr lang="en-AU" smtClean="0"/>
-              <a:t>3/08/2020</a:t>
+              <a:t>4/08/2020</a:t>
             </a:fld>
             <a:endParaRPr lang="en-AU"/>
           </a:p>
@@ -4596,7 +4951,7 @@
           <a:p>
             <a:fld id="{A97D098C-81A2-4741-849D-B3F04101F1CD}" type="datetimeFigureOut">
               <a:rPr lang="en-AU" smtClean="0"/>
-              <a:t>3/08/2020</a:t>
+              <a:t>4/08/2020</a:t>
             </a:fld>
             <a:endParaRPr lang="en-AU"/>
           </a:p>
@@ -4744,7 +5099,7 @@
           <a:p>
             <a:fld id="{A97D098C-81A2-4741-849D-B3F04101F1CD}" type="datetimeFigureOut">
               <a:rPr lang="en-AU" smtClean="0"/>
-              <a:t>3/08/2020</a:t>
+              <a:t>4/08/2020</a:t>
             </a:fld>
             <a:endParaRPr lang="en-AU"/>
           </a:p>
@@ -4869,7 +5224,7 @@
           <a:p>
             <a:fld id="{A97D098C-81A2-4741-849D-B3F04101F1CD}" type="datetimeFigureOut">
               <a:rPr lang="en-AU" smtClean="0"/>
-              <a:t>3/08/2020</a:t>
+              <a:t>4/08/2020</a:t>
             </a:fld>
             <a:endParaRPr lang="en-AU"/>
           </a:p>
@@ -5148,7 +5503,7 @@
           <a:p>
             <a:fld id="{A97D098C-81A2-4741-849D-B3F04101F1CD}" type="datetimeFigureOut">
               <a:rPr lang="en-AU" smtClean="0"/>
-              <a:t>3/08/2020</a:t>
+              <a:t>4/08/2020</a:t>
             </a:fld>
             <a:endParaRPr lang="en-AU"/>
           </a:p>
@@ -5463,7 +5818,7 @@
           <a:p>
             <a:fld id="{A97D098C-81A2-4741-849D-B3F04101F1CD}" type="datetimeFigureOut">
               <a:rPr lang="en-AU" smtClean="0"/>
-              <a:t>3/08/2020</a:t>
+              <a:t>4/08/2020</a:t>
             </a:fld>
             <a:endParaRPr lang="en-AU"/>
           </a:p>
@@ -5716,7 +6071,7 @@
           <a:p>
             <a:fld id="{A97D098C-81A2-4741-849D-B3F04101F1CD}" type="datetimeFigureOut">
               <a:rPr lang="en-AU" smtClean="0"/>
-              <a:t>3/08/2020</a:t>
+              <a:t>4/08/2020</a:t>
             </a:fld>
             <a:endParaRPr lang="en-AU"/>
           </a:p>
@@ -6280,7 +6635,7 @@
               <a:rPr lang="en-AU" dirty="0" smtClean="0">
                 <a:latin typeface="Lucida Sans Typewriter" panose="020B0509030504030204" pitchFamily="49" charset="0"/>
               </a:rPr>
-              <a:t>CITS3402</a:t>
+              <a:t>CITS5507</a:t>
             </a:r>
             <a:endParaRPr lang="en-AU" dirty="0">
               <a:latin typeface="Lucida Sans Typewriter" panose="020B0509030504030204" pitchFamily="49" charset="0"/>
@@ -6305,6 +6660,543 @@
       </p:par>
     </p:tnLst>
   </p:timing>
+</p:sld>
+</file>
+
+<file path=ppt/slides/slide10.xml><?xml version="1.0" encoding="utf-8"?>
+<p:sld xmlns:a="http://schemas.openxmlformats.org/drawingml/2006/main" xmlns:r="http://schemas.openxmlformats.org/officeDocument/2006/relationships" xmlns:p="http://schemas.openxmlformats.org/presentationml/2006/main">
+  <p:cSld>
+    <p:spTree>
+      <p:nvGrpSpPr>
+        <p:cNvPr id="1" name=""/>
+        <p:cNvGrpSpPr/>
+        <p:nvPr/>
+      </p:nvGrpSpPr>
+      <p:grpSpPr>
+        <a:xfrm>
+          <a:off x="0" y="0"/>
+          <a:ext cx="0" cy="0"/>
+          <a:chOff x="0" y="0"/>
+          <a:chExt cx="0" cy="0"/>
+        </a:xfrm>
+      </p:grpSpPr>
+      <p:sp>
+        <p:nvSpPr>
+          <p:cNvPr id="2" name="Title 1"/>
+          <p:cNvSpPr>
+            <a:spLocks noGrp="1"/>
+          </p:cNvSpPr>
+          <p:nvPr>
+            <p:ph type="title"/>
+          </p:nvPr>
+        </p:nvSpPr>
+        <p:spPr>
+          <a:xfrm>
+            <a:off x="913775" y="618517"/>
+            <a:ext cx="10364451" cy="1143915"/>
+          </a:xfrm>
+        </p:spPr>
+        <p:txBody>
+          <a:bodyPr/>
+          <a:lstStyle/>
+          <a:p>
+            <a:r>
+              <a:rPr lang="en-AU" dirty="0" smtClean="0"/>
+              <a:t>VAGRANT BASIC COMMANDS</a:t>
+            </a:r>
+            <a:endParaRPr lang="en-AU" dirty="0"/>
+          </a:p>
+        </p:txBody>
+      </p:sp>
+      <p:sp>
+        <p:nvSpPr>
+          <p:cNvPr id="3" name="TextBox 2"/>
+          <p:cNvSpPr txBox="1"/>
+          <p:nvPr/>
+        </p:nvSpPr>
+        <p:spPr>
+          <a:xfrm>
+            <a:off x="1474840" y="2168013"/>
+            <a:ext cx="9070258" cy="3416320"/>
+          </a:xfrm>
+          <a:prstGeom prst="rect">
+            <a:avLst/>
+          </a:prstGeom>
+          <a:noFill/>
+        </p:spPr>
+        <p:txBody>
+          <a:bodyPr wrap="square" rtlCol="0">
+            <a:spAutoFit/>
+          </a:bodyPr>
+          <a:lstStyle/>
+          <a:p>
+            <a:r>
+              <a:rPr lang="en-AU" dirty="0" smtClean="0"/>
+              <a:t>The basics vagrant commands to manage your virtual instance.</a:t>
+            </a:r>
+          </a:p>
+          <a:p>
+            <a:pPr marL="285750" indent="-285750">
+              <a:buFont typeface="Arial" panose="020B0604020202020204" pitchFamily="34" charset="0"/>
+              <a:buChar char="•"/>
+            </a:pPr>
+            <a:r>
+              <a:rPr lang="en-AU" dirty="0" smtClean="0"/>
+              <a:t>Command: </a:t>
+            </a:r>
+            <a:r>
+              <a:rPr lang="en-AU" b="1" dirty="0" smtClean="0"/>
+              <a:t>vagrant up</a:t>
+            </a:r>
+          </a:p>
+          <a:p>
+            <a:r>
+              <a:rPr lang="en-AU" dirty="0" smtClean="0"/>
+              <a:t>	This command creates and configures guest machines according to your </a:t>
+            </a:r>
+            <a:r>
+              <a:rPr lang="en-AU" dirty="0" err="1" smtClean="0"/>
+              <a:t>Vagrantfile</a:t>
+            </a:r>
+            <a:r>
+              <a:rPr lang="en-AU" dirty="0" smtClean="0"/>
+              <a:t>.</a:t>
+            </a:r>
+          </a:p>
+          <a:p>
+            <a:r>
+              <a:rPr lang="en-AU" dirty="0" smtClean="0"/>
+              <a:t>	This is the single most important command in Vagrant, since it is how any Vagrant machine is 	created. Anyone using Vagrant must use this command on a day-to-day basis.</a:t>
+            </a:r>
+          </a:p>
+          <a:p>
+            <a:endParaRPr lang="en-AU" dirty="0" smtClean="0"/>
+          </a:p>
+          <a:p>
+            <a:pPr marL="285750" indent="-285750">
+              <a:buFont typeface="Arial" panose="020B0604020202020204" pitchFamily="34" charset="0"/>
+              <a:buChar char="•"/>
+            </a:pPr>
+            <a:r>
+              <a:rPr lang="en-AU" dirty="0" smtClean="0"/>
+              <a:t>Command: </a:t>
+            </a:r>
+            <a:r>
+              <a:rPr lang="en-AU" b="1" dirty="0" smtClean="0"/>
+              <a:t>vagrant </a:t>
+            </a:r>
+            <a:r>
+              <a:rPr lang="en-AU" b="1" dirty="0" err="1" smtClean="0"/>
+              <a:t>ssh</a:t>
+            </a:r>
+            <a:endParaRPr lang="en-AU" b="1" dirty="0" smtClean="0"/>
+          </a:p>
+          <a:p>
+            <a:pPr lvl="1"/>
+            <a:r>
+              <a:rPr lang="en-AU" dirty="0" smtClean="0"/>
+              <a:t>This will SSH (</a:t>
+            </a:r>
+            <a:r>
+              <a:rPr lang="en-AU" i="1" dirty="0" smtClean="0"/>
+              <a:t>S</a:t>
+            </a:r>
+            <a:r>
+              <a:rPr lang="en-AU" dirty="0" smtClean="0"/>
+              <a:t>ecure </a:t>
+            </a:r>
+            <a:r>
+              <a:rPr lang="en-AU" i="1" dirty="0" err="1" smtClean="0"/>
+              <a:t>SH</a:t>
+            </a:r>
+            <a:r>
+              <a:rPr lang="en-AU" dirty="0" err="1" smtClean="0"/>
+              <a:t>ell</a:t>
+            </a:r>
+            <a:r>
+              <a:rPr lang="en-AU" dirty="0" smtClean="0"/>
+              <a:t>) into a running Vagrant machine and give you access to a shell.</a:t>
+            </a:r>
+          </a:p>
+          <a:p>
+            <a:pPr lvl="1"/>
+            <a:endParaRPr lang="en-AU" dirty="0"/>
+          </a:p>
+          <a:p>
+            <a:pPr marL="285750" indent="-285750">
+              <a:buFont typeface="Arial" panose="020B0604020202020204" pitchFamily="34" charset="0"/>
+              <a:buChar char="•"/>
+            </a:pPr>
+            <a:r>
+              <a:rPr lang="en-AU" dirty="0" smtClean="0"/>
+              <a:t>Command: </a:t>
+            </a:r>
+            <a:r>
+              <a:rPr lang="en-AU" b="1" dirty="0" smtClean="0"/>
+              <a:t>vagrant status</a:t>
+            </a:r>
+          </a:p>
+          <a:p>
+            <a:pPr lvl="1"/>
+            <a:r>
+              <a:rPr lang="en-AU" dirty="0" smtClean="0"/>
+              <a:t>This will tell you the state of the machines Vagrant is managing. (running, suspended, not created, etc.  This command tells you the state of the underlying guest machine.</a:t>
+            </a:r>
+          </a:p>
+        </p:txBody>
+      </p:sp>
+      <p:sp>
+        <p:nvSpPr>
+          <p:cNvPr id="6" name="Footer Placeholder 5"/>
+          <p:cNvSpPr>
+            <a:spLocks noGrp="1"/>
+          </p:cNvSpPr>
+          <p:nvPr>
+            <p:ph type="ftr" sz="quarter" idx="11"/>
+          </p:nvPr>
+        </p:nvSpPr>
+        <p:spPr>
+          <a:xfrm>
+            <a:off x="913774" y="5611761"/>
+            <a:ext cx="6672887" cy="636639"/>
+          </a:xfrm>
+        </p:spPr>
+        <p:txBody>
+          <a:bodyPr/>
+          <a:lstStyle/>
+          <a:p>
+            <a:r>
+              <a:rPr lang="en-AU" dirty="0" smtClean="0">
+                <a:hlinkClick r:id="rId2"/>
+              </a:rPr>
+              <a:t>https://www.vagrantup.com/docs/cli/up</a:t>
+            </a:r>
+            <a:endParaRPr lang="en-AU" dirty="0" smtClean="0"/>
+          </a:p>
+          <a:p>
+            <a:r>
+              <a:rPr lang="en-AU" dirty="0">
+                <a:hlinkClick r:id="rId3"/>
+              </a:rPr>
+              <a:t>https://</a:t>
+            </a:r>
+            <a:r>
+              <a:rPr lang="en-AU" dirty="0" smtClean="0">
+                <a:hlinkClick r:id="rId3"/>
+              </a:rPr>
+              <a:t>www.vagrantup.com/docs/cli/ssh</a:t>
+            </a:r>
+            <a:endParaRPr lang="en-AU" dirty="0" smtClean="0"/>
+          </a:p>
+          <a:p>
+            <a:r>
+              <a:rPr lang="en-AU" dirty="0">
+                <a:hlinkClick r:id="rId4"/>
+              </a:rPr>
+              <a:t>https://www.vagrantup.com/docs/cli/status</a:t>
+            </a:r>
+            <a:endParaRPr lang="en-AU" dirty="0" smtClean="0"/>
+          </a:p>
+          <a:p>
+            <a:endParaRPr lang="en-AU" dirty="0"/>
+          </a:p>
+        </p:txBody>
+      </p:sp>
+    </p:spTree>
+    <p:extLst>
+      <p:ext uri="{BB962C8B-B14F-4D97-AF65-F5344CB8AC3E}">
+        <p14:creationId xmlns:p14="http://schemas.microsoft.com/office/powerpoint/2010/main" val="935574115"/>
+      </p:ext>
+    </p:extLst>
+  </p:cSld>
+  <p:clrMapOvr>
+    <a:masterClrMapping/>
+  </p:clrMapOvr>
+</p:sld>
+</file>
+
+<file path=ppt/slides/slide11.xml><?xml version="1.0" encoding="utf-8"?>
+<p:sld xmlns:a="http://schemas.openxmlformats.org/drawingml/2006/main" xmlns:r="http://schemas.openxmlformats.org/officeDocument/2006/relationships" xmlns:p="http://schemas.openxmlformats.org/presentationml/2006/main">
+  <p:cSld>
+    <p:spTree>
+      <p:nvGrpSpPr>
+        <p:cNvPr id="1" name=""/>
+        <p:cNvGrpSpPr/>
+        <p:nvPr/>
+      </p:nvGrpSpPr>
+      <p:grpSpPr>
+        <a:xfrm>
+          <a:off x="0" y="0"/>
+          <a:ext cx="0" cy="0"/>
+          <a:chOff x="0" y="0"/>
+          <a:chExt cx="0" cy="0"/>
+        </a:xfrm>
+      </p:grpSpPr>
+      <p:sp>
+        <p:nvSpPr>
+          <p:cNvPr id="2" name="Title 1"/>
+          <p:cNvSpPr>
+            <a:spLocks noGrp="1"/>
+          </p:cNvSpPr>
+          <p:nvPr>
+            <p:ph type="title"/>
+          </p:nvPr>
+        </p:nvSpPr>
+        <p:spPr>
+          <a:xfrm>
+            <a:off x="913775" y="618517"/>
+            <a:ext cx="10364451" cy="841573"/>
+          </a:xfrm>
+        </p:spPr>
+        <p:txBody>
+          <a:bodyPr/>
+          <a:lstStyle/>
+          <a:p>
+            <a:r>
+              <a:rPr lang="en-AU" dirty="0" smtClean="0"/>
+              <a:t>Vagrant Basic Commands</a:t>
+            </a:r>
+            <a:endParaRPr lang="en-AU" dirty="0"/>
+          </a:p>
+        </p:txBody>
+      </p:sp>
+      <p:sp>
+        <p:nvSpPr>
+          <p:cNvPr id="3" name="TextBox 2"/>
+          <p:cNvSpPr txBox="1"/>
+          <p:nvPr/>
+        </p:nvSpPr>
+        <p:spPr>
+          <a:xfrm>
+            <a:off x="1456364" y="1409525"/>
+            <a:ext cx="9279272" cy="4524315"/>
+          </a:xfrm>
+          <a:prstGeom prst="rect">
+            <a:avLst/>
+          </a:prstGeom>
+          <a:noFill/>
+        </p:spPr>
+        <p:txBody>
+          <a:bodyPr wrap="none" rtlCol="0">
+            <a:spAutoFit/>
+          </a:bodyPr>
+          <a:lstStyle/>
+          <a:p>
+            <a:r>
+              <a:rPr lang="en-AU" dirty="0" smtClean="0"/>
+              <a:t>The vagrant commands for shutting down your Vagrant machine and destroying </a:t>
+            </a:r>
+          </a:p>
+          <a:p>
+            <a:r>
+              <a:rPr lang="en-AU" dirty="0" smtClean="0"/>
+              <a:t>your Vagrant machine. It is important to understand the differences.</a:t>
+            </a:r>
+          </a:p>
+          <a:p>
+            <a:endParaRPr lang="en-AU" dirty="0" smtClean="0"/>
+          </a:p>
+          <a:p>
+            <a:pPr marL="285750" indent="-285750">
+              <a:buFont typeface="Arial" panose="020B0604020202020204" pitchFamily="34" charset="0"/>
+              <a:buChar char="•"/>
+            </a:pPr>
+            <a:r>
+              <a:rPr lang="en-AU" dirty="0" smtClean="0"/>
+              <a:t>Command: </a:t>
+            </a:r>
+            <a:r>
+              <a:rPr lang="en-AU" b="1" dirty="0" smtClean="0"/>
+              <a:t>vagrant halt</a:t>
+            </a:r>
+          </a:p>
+          <a:p>
+            <a:pPr lvl="1"/>
+            <a:r>
+              <a:rPr lang="en-AU" dirty="0" smtClean="0"/>
+              <a:t>This command shuts down the running machine Vagrant is managing. This frees up</a:t>
+            </a:r>
+          </a:p>
+          <a:p>
+            <a:pPr lvl="1"/>
+            <a:r>
+              <a:rPr lang="en-AU" dirty="0" smtClean="0"/>
+              <a:t>the resources (CPU cores and RAM) allocated to the Virtual machine.  It saves the environment </a:t>
+            </a:r>
+          </a:p>
+          <a:p>
+            <a:pPr lvl="1"/>
+            <a:r>
+              <a:rPr lang="en-AU" dirty="0" smtClean="0"/>
+              <a:t>and files.  Vagrant will effectively just shut off power to the machine. The Vagrant command </a:t>
+            </a:r>
+          </a:p>
+          <a:p>
+            <a:pPr lvl="1"/>
+            <a:r>
+              <a:rPr lang="en-AU" dirty="0" smtClean="0"/>
+              <a:t>“vagrant up” will restart the Vagrant machine to it’s previous state.  </a:t>
+            </a:r>
+          </a:p>
+          <a:p>
+            <a:pPr lvl="1"/>
+            <a:r>
+              <a:rPr lang="en-AU" dirty="0" smtClean="0"/>
+              <a:t>  </a:t>
+            </a:r>
+          </a:p>
+          <a:p>
+            <a:pPr marL="285750" indent="-285750">
+              <a:buFont typeface="Arial" panose="020B0604020202020204" pitchFamily="34" charset="0"/>
+              <a:buChar char="•"/>
+            </a:pPr>
+            <a:r>
+              <a:rPr lang="en-AU" dirty="0" smtClean="0"/>
+              <a:t>Command: </a:t>
+            </a:r>
+            <a:r>
+              <a:rPr lang="en-AU" b="1" dirty="0" smtClean="0"/>
+              <a:t>vagrant</a:t>
+            </a:r>
+            <a:r>
+              <a:rPr lang="en-AU" dirty="0" smtClean="0"/>
+              <a:t> </a:t>
+            </a:r>
+            <a:r>
+              <a:rPr lang="en-AU" b="1" dirty="0" smtClean="0"/>
+              <a:t>destroy</a:t>
+            </a:r>
+          </a:p>
+          <a:p>
+            <a:pPr lvl="1"/>
+            <a:r>
+              <a:rPr lang="en-AU" dirty="0"/>
+              <a:t>This command stops the running machine Vagrant is managing and destroys all </a:t>
+            </a:r>
+            <a:r>
+              <a:rPr lang="en-AU" dirty="0" smtClean="0"/>
+              <a:t>resources </a:t>
+            </a:r>
+          </a:p>
+          <a:p>
+            <a:pPr lvl="1"/>
+            <a:r>
+              <a:rPr lang="en-AU" dirty="0" smtClean="0"/>
+              <a:t>(CPU cores, RAM, and </a:t>
+            </a:r>
+            <a:r>
+              <a:rPr lang="en-AU" dirty="0" err="1" smtClean="0"/>
+              <a:t>diskspace</a:t>
+            </a:r>
+            <a:r>
+              <a:rPr lang="en-AU" dirty="0" smtClean="0"/>
+              <a:t>) </a:t>
+            </a:r>
+            <a:r>
+              <a:rPr lang="en-AU" dirty="0"/>
+              <a:t>that were </a:t>
+            </a:r>
+            <a:r>
+              <a:rPr lang="en-AU" dirty="0" smtClean="0"/>
+              <a:t>allocated </a:t>
+            </a:r>
+            <a:r>
+              <a:rPr lang="en-AU" dirty="0"/>
+              <a:t>during the machine creation process. </a:t>
+            </a:r>
+            <a:endParaRPr lang="en-AU" dirty="0" smtClean="0"/>
+          </a:p>
+          <a:p>
+            <a:pPr lvl="1"/>
+            <a:r>
+              <a:rPr lang="en-AU" dirty="0" smtClean="0"/>
+              <a:t>After </a:t>
+            </a:r>
+            <a:r>
+              <a:rPr lang="en-AU" dirty="0"/>
+              <a:t>running </a:t>
+            </a:r>
+            <a:r>
+              <a:rPr lang="en-AU" dirty="0" smtClean="0"/>
+              <a:t>this </a:t>
+            </a:r>
+            <a:r>
+              <a:rPr lang="en-AU" dirty="0"/>
+              <a:t>command, your computer should be left at a clean state, as if you never </a:t>
+            </a:r>
+            <a:endParaRPr lang="en-AU" dirty="0" smtClean="0"/>
+          </a:p>
+          <a:p>
+            <a:pPr lvl="1"/>
+            <a:r>
+              <a:rPr lang="en-AU" dirty="0" smtClean="0"/>
+              <a:t>created </a:t>
+            </a:r>
+            <a:r>
+              <a:rPr lang="en-AU" dirty="0"/>
+              <a:t>the guest machine in the first place</a:t>
+            </a:r>
+            <a:r>
+              <a:rPr lang="en-AU" dirty="0" smtClean="0"/>
+              <a:t>.  The FILES in your SHARED directories</a:t>
+            </a:r>
+          </a:p>
+          <a:p>
+            <a:pPr lvl="1"/>
+            <a:r>
+              <a:rPr lang="en-AU" dirty="0" smtClean="0"/>
+              <a:t>are not deleted!!</a:t>
+            </a:r>
+          </a:p>
+          <a:p>
+            <a:endParaRPr lang="en-AU" dirty="0"/>
+          </a:p>
+        </p:txBody>
+      </p:sp>
+      <p:sp>
+        <p:nvSpPr>
+          <p:cNvPr id="4" name="Footer Placeholder 3"/>
+          <p:cNvSpPr>
+            <a:spLocks noGrp="1"/>
+          </p:cNvSpPr>
+          <p:nvPr>
+            <p:ph type="ftr" sz="quarter" idx="11"/>
+          </p:nvPr>
+        </p:nvSpPr>
+        <p:spPr/>
+        <p:txBody>
+          <a:bodyPr/>
+          <a:lstStyle/>
+          <a:p>
+            <a:r>
+              <a:rPr lang="en-AU" dirty="0" smtClean="0">
+                <a:hlinkClick r:id="rId2"/>
+              </a:rPr>
+              <a:t>https://www.vagrantup.com/docs/cli/halt</a:t>
+            </a:r>
+            <a:endParaRPr lang="en-AU" dirty="0" smtClean="0"/>
+          </a:p>
+          <a:p>
+            <a:r>
+              <a:rPr lang="en-AU" dirty="0">
+                <a:hlinkClick r:id="rId3"/>
+              </a:rPr>
+              <a:t>https://www.vagrantup.com/docs/cli/destroy</a:t>
+            </a:r>
+            <a:endParaRPr lang="en-AU" dirty="0"/>
+          </a:p>
+        </p:txBody>
+      </p:sp>
+    </p:spTree>
+    <p:extLst>
+      <p:ext uri="{BB962C8B-B14F-4D97-AF65-F5344CB8AC3E}">
+        <p14:creationId xmlns:p14="http://schemas.microsoft.com/office/powerpoint/2010/main" val="2450998688"/>
+      </p:ext>
+    </p:extLst>
+  </p:cSld>
+  <p:clrMapOvr>
+    <a:masterClrMapping/>
+  </p:clrMapOvr>
 </p:sld>
 </file>
 
@@ -6751,23 +7643,14 @@
           <a:p>
             <a:r>
               <a:rPr lang="en-AU" dirty="0" smtClean="0"/>
-              <a:t>If it returns the version number as shown above you are good to go</a:t>
-            </a:r>
+              <a:t>If it returns the version number as shown above you are good to go!</a:t>
+            </a:r>
+          </a:p>
+          <a:p>
             <a:r>
               <a:rPr lang="en-AU" dirty="0" smtClean="0"/>
-              <a:t>!</a:t>
-            </a:r>
-          </a:p>
-          <a:p>
-            <a:r>
-              <a:rPr lang="en-AU" dirty="0" smtClean="0"/>
-              <a:t>NOTE 2.2.9 is the latest and everything will work with it as well.</a:t>
-            </a:r>
-            <a:r>
-              <a:rPr lang="en-AU" dirty="0" smtClean="0"/>
-              <a:t> </a:t>
-            </a:r>
-            <a:endParaRPr lang="en-AU" dirty="0" smtClean="0"/>
+              <a:t>NOTE 2.2.9 is the latest and everything will work with it as well. </a:t>
+            </a:r>
           </a:p>
         </p:txBody>
       </p:sp>
@@ -7123,7 +8006,7 @@
                 <a:latin typeface="Lucida Sans" panose="020B0602030504020204" pitchFamily="34" charset="0"/>
                 <a:cs typeface="Arial" panose="020B0604020202020204" pitchFamily="34" charset="0"/>
               </a:rPr>
-              <a:t>cits3402</a:t>
+              <a:t>cits5507</a:t>
             </a:r>
             <a:endParaRPr lang="en-AU" dirty="0" smtClean="0">
               <a:latin typeface="Lucida Sans" panose="020B0602030504020204" pitchFamily="34" charset="0"/>
@@ -7205,7 +8088,7 @@
                 <a:latin typeface="Lucida Sans" panose="020B0602030504020204" pitchFamily="34" charset="0"/>
                 <a:cs typeface="Arial" panose="020B0604020202020204" pitchFamily="34" charset="0"/>
               </a:rPr>
-              <a:t>cits3402</a:t>
+              <a:t>cits5507</a:t>
             </a:r>
             <a:endParaRPr lang="en-AU" dirty="0" smtClean="0">
               <a:latin typeface="Lucida Sans" panose="020B0602030504020204" pitchFamily="34" charset="0"/>
@@ -7235,7 +8118,7 @@
                 <a:latin typeface="Arial" panose="020B0604020202020204" pitchFamily="34" charset="0"/>
                 <a:cs typeface="Arial" panose="020B0604020202020204" pitchFamily="34" charset="0"/>
               </a:rPr>
-              <a:t>cits3402 </a:t>
+              <a:t>cits5507 </a:t>
             </a:r>
             <a:r>
               <a:rPr lang="en-AU" dirty="0" smtClean="0">
@@ -7282,7 +8165,7 @@
                 <a:latin typeface="Lucida Sans" panose="020B0602030504020204" pitchFamily="34" charset="0"/>
                 <a:cs typeface="Arial" panose="020B0604020202020204" pitchFamily="34" charset="0"/>
               </a:rPr>
-              <a:t>cits3402</a:t>
+              <a:t>cits5507</a:t>
             </a:r>
             <a:endParaRPr lang="en-AU" dirty="0" smtClean="0">
               <a:latin typeface="Lucida Sans" panose="020B0602030504020204" pitchFamily="34" charset="0"/>
@@ -7609,7 +8492,7 @@
                 <a:latin typeface="Arial" panose="020B0604020202020204" pitchFamily="34" charset="0"/>
                 <a:cs typeface="Arial" panose="020B0604020202020204" pitchFamily="34" charset="0"/>
               </a:rPr>
-              <a:t>cits3204/HPC </a:t>
+              <a:t>cits5507/HPC </a:t>
             </a:r>
             <a:r>
               <a:rPr lang="en-AU" dirty="0" smtClean="0">
@@ -7710,21 +8593,24 @@
                 <a:latin typeface="Arial" panose="020B0604020202020204" pitchFamily="34" charset="0"/>
                 <a:cs typeface="Arial" panose="020B0604020202020204" pitchFamily="34" charset="0"/>
               </a:rPr>
-              <a:t> directory and you MUST be in the </a:t>
+              <a:t> directory and </a:t>
             </a:r>
             <a:r>
               <a:rPr lang="en-AU" b="1" dirty="0" smtClean="0">
+                <a:solidFill>
+                  <a:srgbClr val="FF0000"/>
+                </a:solidFill>
                 <a:latin typeface="Arial" panose="020B0604020202020204" pitchFamily="34" charset="0"/>
                 <a:cs typeface="Arial" panose="020B0604020202020204" pitchFamily="34" charset="0"/>
               </a:rPr>
-              <a:t>HPC</a:t>
+              <a:t>you MUST be in the HPC directory</a:t>
             </a:r>
             <a:r>
               <a:rPr lang="en-AU" dirty="0" smtClean="0">
                 <a:latin typeface="Arial" panose="020B0604020202020204" pitchFamily="34" charset="0"/>
                 <a:cs typeface="Arial" panose="020B0604020202020204" pitchFamily="34" charset="0"/>
               </a:rPr>
-              <a:t> directory as that is where the </a:t>
+              <a:t> as that is where the </a:t>
             </a:r>
             <a:r>
               <a:rPr lang="en-AU" dirty="0" err="1" smtClean="0">
@@ -7801,10 +8687,8 @@
                 <a:latin typeface="Arial" panose="020B0604020202020204" pitchFamily="34" charset="0"/>
                 <a:cs typeface="Arial" panose="020B0604020202020204" pitchFamily="34" charset="0"/>
               </a:rPr>
-              <a:t>Coffee Break:</a:t>
-            </a:r>
-          </a:p>
-          <a:p>
+              <a:t>Coffee Break</a:t>
+            </a:r>
             <a:r>
               <a:rPr lang="en-AU" dirty="0" smtClean="0">
                 <a:solidFill>
@@ -7813,6 +8697,25 @@
                 <a:latin typeface="Arial" panose="020B0604020202020204" pitchFamily="34" charset="0"/>
                 <a:cs typeface="Arial" panose="020B0604020202020204" pitchFamily="34" charset="0"/>
               </a:rPr>
+              <a:t>: </a:t>
+            </a:r>
+            <a:endParaRPr lang="en-AU" dirty="0" smtClean="0">
+              <a:solidFill>
+                <a:srgbClr val="FF0000"/>
+              </a:solidFill>
+              <a:latin typeface="Arial" panose="020B0604020202020204" pitchFamily="34" charset="0"/>
+              <a:cs typeface="Arial" panose="020B0604020202020204" pitchFamily="34" charset="0"/>
+            </a:endParaRPr>
+          </a:p>
+          <a:p>
+            <a:r>
+              <a:rPr lang="en-AU" dirty="0" smtClean="0">
+                <a:solidFill>
+                  <a:srgbClr val="FF0000"/>
+                </a:solidFill>
+                <a:latin typeface="Arial" panose="020B0604020202020204" pitchFamily="34" charset="0"/>
+                <a:cs typeface="Arial" panose="020B0604020202020204" pitchFamily="34" charset="0"/>
+              </a:rPr>
               <a:t>This </a:t>
             </a:r>
             <a:r>
@@ -7823,7 +8726,7 @@
                 <a:latin typeface="Arial" panose="020B0604020202020204" pitchFamily="34" charset="0"/>
                 <a:cs typeface="Arial" panose="020B0604020202020204" pitchFamily="34" charset="0"/>
               </a:rPr>
-              <a:t>will take some time</a:t>
+              <a:t>can take up to 30 minutes</a:t>
             </a:r>
             <a:r>
               <a:rPr lang="en-AU" dirty="0" smtClean="0">
@@ -7833,7 +8736,17 @@
                 <a:latin typeface="Arial" panose="020B0604020202020204" pitchFamily="34" charset="0"/>
                 <a:cs typeface="Arial" panose="020B0604020202020204" pitchFamily="34" charset="0"/>
               </a:rPr>
-              <a:t> as it automatically downloading and configuring the base Ubuntu OS image that is used for your VM</a:t>
+              <a:t> </a:t>
+            </a:r>
+            <a:r>
+              <a:rPr lang="en-AU" dirty="0" smtClean="0">
+                <a:solidFill>
+                  <a:srgbClr val="FF0000"/>
+                </a:solidFill>
+                <a:latin typeface="Arial" panose="020B0604020202020204" pitchFamily="34" charset="0"/>
+                <a:cs typeface="Arial" panose="020B0604020202020204" pitchFamily="34" charset="0"/>
+              </a:rPr>
+              <a:t>as it automatically downloading and configuring the base Ubuntu OS image that is used for your VM</a:t>
             </a:r>
             <a:r>
               <a:rPr lang="en-AU" dirty="0" smtClean="0">
@@ -8030,7 +8943,7 @@
                 <a:latin typeface="Arial" panose="020B0604020202020204" pitchFamily="34" charset="0"/>
                 <a:cs typeface="Arial" panose="020B0604020202020204" pitchFamily="34" charset="0"/>
               </a:rPr>
-              <a:t>will take some tim</a:t>
+              <a:t>can take up to 30 minutes</a:t>
             </a:r>
             <a:r>
               <a:rPr lang="en-AU" dirty="0" smtClean="0">
@@ -8040,10 +8953,8 @@
                 <a:latin typeface="Arial" panose="020B0604020202020204" pitchFamily="34" charset="0"/>
                 <a:cs typeface="Arial" panose="020B0604020202020204" pitchFamily="34" charset="0"/>
               </a:rPr>
-              <a:t>e to complete! Depending on your laptop processor speed.  </a:t>
-            </a:r>
-          </a:p>
-          <a:p>
+              <a:t> </a:t>
+            </a:r>
             <a:r>
               <a:rPr lang="en-AU" dirty="0" smtClean="0">
                 <a:solidFill>
@@ -8052,6 +8963,18 @@
                 <a:latin typeface="Arial" panose="020B0604020202020204" pitchFamily="34" charset="0"/>
                 <a:cs typeface="Arial" panose="020B0604020202020204" pitchFamily="34" charset="0"/>
               </a:rPr>
+              <a:t>to complete! Depending on your laptop processor speed.  </a:t>
+            </a:r>
+          </a:p>
+          <a:p>
+            <a:r>
+              <a:rPr lang="en-AU" dirty="0" smtClean="0">
+                <a:solidFill>
+                  <a:srgbClr val="FF0000"/>
+                </a:solidFill>
+                <a:latin typeface="Arial" panose="020B0604020202020204" pitchFamily="34" charset="0"/>
+                <a:cs typeface="Arial" panose="020B0604020202020204" pitchFamily="34" charset="0"/>
+              </a:rPr>
               <a:t>Go get a coffee!  If you do work on your laptop or surf the net it will just take longer!</a:t>
             </a:r>
           </a:p>
@@ -8063,7 +8986,7 @@
           </a:p>
           <a:p>
             <a:r>
-              <a:rPr lang="en-AU" sz="2400" dirty="0" smtClean="0">
+              <a:rPr lang="en-AU" sz="2400" b="1" i="1" dirty="0" smtClean="0">
                 <a:solidFill>
                   <a:schemeClr val="accent2">
                     <a:lumMod val="60000"/>
@@ -8076,7 +8999,7 @@
               <a:t>Good news</a:t>
             </a:r>
             <a:r>
-              <a:rPr lang="en-AU" dirty="0" smtClean="0">
+              <a:rPr lang="en-AU" b="1" i="1" dirty="0" smtClean="0">
                 <a:solidFill>
                   <a:schemeClr val="accent2">
                     <a:lumMod val="60000"/>
@@ -8101,42 +9024,21 @@
                 <a:latin typeface="Arial" panose="020B0604020202020204" pitchFamily="34" charset="0"/>
                 <a:cs typeface="Arial" panose="020B0604020202020204" pitchFamily="34" charset="0"/>
               </a:rPr>
-              <a:t>Step 4b: To ensure that you correctly pickup all the changes to your environment the simplest thing </a:t>
+              <a:t>Step 4b: To ensure that you correctly pickup all the changes to your environment the simplest thing to do</a:t>
+            </a:r>
+            <a:r>
+              <a:rPr lang="en-AU" dirty="0">
+                <a:latin typeface="Arial" panose="020B0604020202020204" pitchFamily="34" charset="0"/>
+                <a:cs typeface="Arial" panose="020B0604020202020204" pitchFamily="34" charset="0"/>
+              </a:rPr>
+              <a:t> i</a:t>
             </a:r>
             <a:r>
               <a:rPr lang="en-AU" dirty="0" smtClean="0">
                 <a:latin typeface="Arial" panose="020B0604020202020204" pitchFamily="34" charset="0"/>
                 <a:cs typeface="Arial" panose="020B0604020202020204" pitchFamily="34" charset="0"/>
               </a:rPr>
-              <a:t>to do</a:t>
-            </a:r>
-            <a:r>
-              <a:rPr lang="en-AU" dirty="0">
-                <a:latin typeface="Arial" panose="020B0604020202020204" pitchFamily="34" charset="0"/>
-                <a:cs typeface="Arial" panose="020B0604020202020204" pitchFamily="34" charset="0"/>
-              </a:rPr>
-              <a:t> </a:t>
-            </a:r>
-            <a:r>
-              <a:rPr lang="en-AU" dirty="0">
-                <a:latin typeface="Arial" panose="020B0604020202020204" pitchFamily="34" charset="0"/>
-                <a:cs typeface="Arial" panose="020B0604020202020204" pitchFamily="34" charset="0"/>
-              </a:rPr>
-              <a:t>i</a:t>
-            </a:r>
-            <a:r>
-              <a:rPr lang="en-AU" dirty="0" smtClean="0">
-                <a:latin typeface="Arial" panose="020B0604020202020204" pitchFamily="34" charset="0"/>
-                <a:cs typeface="Arial" panose="020B0604020202020204" pitchFamily="34" charset="0"/>
-              </a:rPr>
-              <a:t>s </a:t>
-            </a:r>
-            <a:r>
-              <a:rPr lang="en-AU" dirty="0" smtClean="0">
-                <a:latin typeface="Arial" panose="020B0604020202020204" pitchFamily="34" charset="0"/>
-                <a:cs typeface="Arial" panose="020B0604020202020204" pitchFamily="34" charset="0"/>
-              </a:rPr>
-              <a:t>log out and log back in to the VM</a:t>
+              <a:t>s log out and log back in to the VM</a:t>
             </a:r>
           </a:p>
           <a:p>
@@ -8330,8 +9232,8 @@
         </p:nvSpPr>
         <p:spPr>
           <a:xfrm>
-            <a:off x="1559856" y="1690688"/>
-            <a:ext cx="9072122" cy="4247317"/>
+            <a:off x="1231490" y="1690688"/>
+            <a:ext cx="9400488" cy="4247317"/>
           </a:xfrm>
           <a:prstGeom prst="rect">
             <a:avLst/>
@@ -8346,10 +9248,20 @@
           <a:p>
             <a:r>
               <a:rPr lang="en-AU" dirty="0" smtClean="0">
+                <a:solidFill>
+                  <a:srgbClr val="FFFF00"/>
+                </a:solidFill>
                 <a:latin typeface="Arial" panose="020B0604020202020204" pitchFamily="34" charset="0"/>
                 <a:cs typeface="Arial" panose="020B0604020202020204" pitchFamily="34" charset="0"/>
               </a:rPr>
-              <a:t>Step 1  - Create the project directory</a:t>
+              <a:t>Step 1</a:t>
+            </a:r>
+            <a:r>
+              <a:rPr lang="en-AU" dirty="0" smtClean="0">
+                <a:latin typeface="Arial" panose="020B0604020202020204" pitchFamily="34" charset="0"/>
+                <a:cs typeface="Arial" panose="020B0604020202020204" pitchFamily="34" charset="0"/>
+              </a:rPr>
+              <a:t>  - Create the project directory</a:t>
             </a:r>
           </a:p>
           <a:p>
@@ -8376,7 +9288,7 @@
                 <a:latin typeface="Lucida Sans Typewriter" panose="020B0509030504030204" pitchFamily="49" charset="0"/>
                 <a:cs typeface="Arial" panose="020B0604020202020204" pitchFamily="34" charset="0"/>
               </a:rPr>
-              <a:t>cits3204</a:t>
+              <a:t>cits5507</a:t>
             </a:r>
             <a:endParaRPr lang="en-AU" dirty="0" smtClean="0">
               <a:latin typeface="Lucida Sans Typewriter" panose="020B0509030504030204" pitchFamily="49" charset="0"/>
@@ -8400,7 +9312,7 @@
                 <a:latin typeface="Lucida Sans Typewriter" panose="020B0509030504030204" pitchFamily="49" charset="0"/>
                 <a:cs typeface="Arial" panose="020B0604020202020204" pitchFamily="34" charset="0"/>
               </a:rPr>
-              <a:t>cits3204</a:t>
+              <a:t>cits5507</a:t>
             </a:r>
             <a:endParaRPr lang="en-AU" dirty="0" smtClean="0">
               <a:latin typeface="Lucida Sans Typewriter" panose="020B0509030504030204" pitchFamily="49" charset="0"/>
@@ -8410,17 +9322,27 @@
           <a:p>
             <a:r>
               <a:rPr lang="en-AU" dirty="0" smtClean="0">
+                <a:solidFill>
+                  <a:srgbClr val="FFFF00"/>
+                </a:solidFill>
                 <a:latin typeface="Arial" panose="020B0604020202020204" pitchFamily="34" charset="0"/>
                 <a:cs typeface="Arial" panose="020B0604020202020204" pitchFamily="34" charset="0"/>
               </a:rPr>
-              <a:t>Step 2  - Clone the repository with </a:t>
-            </a:r>
-            <a:r>
-              <a:rPr lang="en-AU" smtClean="0">
+              <a:t>Step 2</a:t>
+            </a:r>
+            <a:r>
+              <a:rPr lang="en-AU" dirty="0" smtClean="0">
                 <a:latin typeface="Arial" panose="020B0604020202020204" pitchFamily="34" charset="0"/>
                 <a:cs typeface="Arial" panose="020B0604020202020204" pitchFamily="34" charset="0"/>
               </a:rPr>
-              <a:t>the HPC Vagrantfile</a:t>
+              <a:t>  - Clone the repository with the HPC </a:t>
+            </a:r>
+            <a:r>
+              <a:rPr lang="en-AU" dirty="0" err="1" smtClean="0">
+                <a:latin typeface="Arial" panose="020B0604020202020204" pitchFamily="34" charset="0"/>
+                <a:cs typeface="Arial" panose="020B0604020202020204" pitchFamily="34" charset="0"/>
+              </a:rPr>
+              <a:t>Vagrantfile</a:t>
             </a:r>
             <a:endParaRPr lang="en-AU" dirty="0" smtClean="0">
               <a:latin typeface="Arial" panose="020B0604020202020204" pitchFamily="34" charset="0"/>
@@ -8443,10 +9365,20 @@
           <a:p>
             <a:r>
               <a:rPr lang="en-AU" dirty="0" smtClean="0">
+                <a:solidFill>
+                  <a:srgbClr val="FFFF00"/>
+                </a:solidFill>
                 <a:latin typeface="Arial" panose="020B0604020202020204" pitchFamily="34" charset="0"/>
                 <a:cs typeface="Arial" panose="020B0604020202020204" pitchFamily="34" charset="0"/>
               </a:rPr>
-              <a:t>Step 3  - launch the Virtual machine</a:t>
+              <a:t>Step 3</a:t>
+            </a:r>
+            <a:r>
+              <a:rPr lang="en-AU" dirty="0" smtClean="0">
+                <a:latin typeface="Arial" panose="020B0604020202020204" pitchFamily="34" charset="0"/>
+                <a:cs typeface="Arial" panose="020B0604020202020204" pitchFamily="34" charset="0"/>
+              </a:rPr>
+              <a:t>  - launch the Virtual machine</a:t>
             </a:r>
           </a:p>
           <a:p>
@@ -8472,16 +9404,67 @@
                 <a:latin typeface="Lucida Sans Typewriter" panose="020B0509030504030204" pitchFamily="49" charset="0"/>
                 <a:cs typeface="Arial" panose="020B0604020202020204" pitchFamily="34" charset="0"/>
               </a:rPr>
-              <a:t>vagrant up</a:t>
-            </a:r>
-          </a:p>
-          <a:p>
+              <a:t>vagrant </a:t>
+            </a:r>
+            <a:r>
+              <a:rPr lang="en-AU" dirty="0" smtClean="0">
+                <a:latin typeface="Lucida Sans Typewriter" panose="020B0509030504030204" pitchFamily="49" charset="0"/>
+                <a:cs typeface="Arial" panose="020B0604020202020204" pitchFamily="34" charset="0"/>
+              </a:rPr>
+              <a:t>up     </a:t>
+            </a:r>
+            <a:r>
+              <a:rPr lang="en-AU" dirty="0" smtClean="0">
+                <a:solidFill>
+                  <a:srgbClr val="FF0000"/>
+                </a:solidFill>
+                <a:latin typeface="Lucida Sans Typewriter" panose="020B0509030504030204" pitchFamily="49" charset="0"/>
+                <a:cs typeface="Arial" panose="020B0604020202020204" pitchFamily="34" charset="0"/>
+              </a:rPr>
+              <a:t>---- </a:t>
+            </a:r>
+            <a:r>
+              <a:rPr lang="en-AU" dirty="0">
+                <a:solidFill>
+                  <a:srgbClr val="FF0000"/>
+                </a:solidFill>
+                <a:latin typeface="Lucida Sans Typewriter" panose="020B0509030504030204" pitchFamily="49" charset="0"/>
+                <a:cs typeface="Arial" panose="020B0604020202020204" pitchFamily="34" charset="0"/>
+              </a:rPr>
+              <a:t>note this can take up to 30 </a:t>
+            </a:r>
+            <a:r>
+              <a:rPr lang="en-AU" dirty="0" smtClean="0">
+                <a:solidFill>
+                  <a:srgbClr val="FF0000"/>
+                </a:solidFill>
+                <a:latin typeface="Lucida Sans Typewriter" panose="020B0509030504030204" pitchFamily="49" charset="0"/>
+                <a:cs typeface="Arial" panose="020B0604020202020204" pitchFamily="34" charset="0"/>
+              </a:rPr>
+              <a:t>minutes</a:t>
+            </a:r>
+            <a:endParaRPr lang="en-AU" dirty="0" smtClean="0">
+              <a:latin typeface="Lucida Sans Typewriter" panose="020B0509030504030204" pitchFamily="49" charset="0"/>
+              <a:cs typeface="Arial" panose="020B0604020202020204" pitchFamily="34" charset="0"/>
+            </a:endParaRPr>
+          </a:p>
+          <a:p>
+            <a:r>
+              <a:rPr lang="en-AU" dirty="0" smtClean="0">
+                <a:solidFill>
+                  <a:srgbClr val="FFFF00"/>
+                </a:solidFill>
+                <a:latin typeface="Arial" panose="020B0604020202020204" pitchFamily="34" charset="0"/>
+                <a:cs typeface="Arial" panose="020B0604020202020204" pitchFamily="34" charset="0"/>
+              </a:rPr>
+              <a:t>Step 4</a:t>
+            </a:r>
             <a:r>
               <a:rPr lang="en-AU" dirty="0" smtClean="0">
                 <a:latin typeface="Arial" panose="020B0604020202020204" pitchFamily="34" charset="0"/>
                 <a:cs typeface="Arial" panose="020B0604020202020204" pitchFamily="34" charset="0"/>
               </a:rPr>
-              <a:t>Step 4  - login to the virtual machine </a:t>
+              <a:t>  - login to the virtual machine </a:t>
             </a:r>
           </a:p>
           <a:p>
@@ -8511,10 +9494,20 @@
           <a:p>
             <a:r>
               <a:rPr lang="en-AU" dirty="0" smtClean="0">
+                <a:solidFill>
+                  <a:srgbClr val="FFFF00"/>
+                </a:solidFill>
                 <a:latin typeface="Arial" panose="020B0604020202020204" pitchFamily="34" charset="0"/>
                 <a:cs typeface="Arial" panose="020B0604020202020204" pitchFamily="34" charset="0"/>
               </a:rPr>
-              <a:t>Step 4a  - run the setup command</a:t>
+              <a:t>Step 4a  </a:t>
+            </a:r>
+            <a:r>
+              <a:rPr lang="en-AU" dirty="0" smtClean="0">
+                <a:latin typeface="Arial" panose="020B0604020202020204" pitchFamily="34" charset="0"/>
+                <a:cs typeface="Arial" panose="020B0604020202020204" pitchFamily="34" charset="0"/>
+              </a:rPr>
+              <a:t>- run the setup command</a:t>
             </a:r>
           </a:p>
           <a:p>
@@ -8527,16 +9520,50 @@
                 <a:latin typeface="Lucida Sans Typewriter" panose="020B0509030504030204" pitchFamily="49" charset="0"/>
                 <a:cs typeface="Arial" panose="020B0604020202020204" pitchFamily="34" charset="0"/>
               </a:rPr>
-              <a:t>./setup.sh</a:t>
-            </a:r>
-          </a:p>
-          <a:p>
+              <a:t>./</a:t>
+            </a:r>
+            <a:r>
+              <a:rPr lang="en-AU" dirty="0" smtClean="0">
+                <a:latin typeface="Lucida Sans Typewriter" panose="020B0509030504030204" pitchFamily="49" charset="0"/>
+                <a:cs typeface="Arial" panose="020B0604020202020204" pitchFamily="34" charset="0"/>
+              </a:rPr>
+              <a:t>setup.sh     </a:t>
+            </a:r>
+            <a:r>
+              <a:rPr lang="en-AU" dirty="0" smtClean="0">
+                <a:solidFill>
+                  <a:srgbClr val="FF0000"/>
+                </a:solidFill>
+                <a:latin typeface="Lucida Sans Typewriter" panose="020B0509030504030204" pitchFamily="49" charset="0"/>
+                <a:cs typeface="Arial" panose="020B0604020202020204" pitchFamily="34" charset="0"/>
+              </a:rPr>
+              <a:t>---- note this can take up to 30 minutes</a:t>
+            </a:r>
+            <a:endParaRPr lang="en-AU" dirty="0" smtClean="0">
+              <a:solidFill>
+                <a:srgbClr val="FF0000"/>
+              </a:solidFill>
+              <a:latin typeface="Lucida Sans Typewriter" panose="020B0509030504030204" pitchFamily="49" charset="0"/>
+              <a:cs typeface="Arial" panose="020B0604020202020204" pitchFamily="34" charset="0"/>
+            </a:endParaRPr>
+          </a:p>
+          <a:p>
+            <a:r>
+              <a:rPr lang="en-AU" dirty="0" smtClean="0">
+                <a:solidFill>
+                  <a:srgbClr val="FFFF00"/>
+                </a:solidFill>
+                <a:latin typeface="Arial" panose="020B0604020202020204" pitchFamily="34" charset="0"/>
+                <a:cs typeface="Arial" panose="020B0604020202020204" pitchFamily="34" charset="0"/>
+              </a:rPr>
+              <a:t>Step 4b </a:t>
+            </a:r>
             <a:r>
               <a:rPr lang="en-AU" dirty="0" smtClean="0">
                 <a:latin typeface="Arial" panose="020B0604020202020204" pitchFamily="34" charset="0"/>
                 <a:cs typeface="Arial" panose="020B0604020202020204" pitchFamily="34" charset="0"/>
               </a:rPr>
-              <a:t>Step 4b – initialize the environment permanently.</a:t>
+              <a:t>– initialize the environment permanently.</a:t>
             </a:r>
           </a:p>
           <a:p>
@@ -8862,7 +9889,283 @@
 </a:theme>
 </file>
 
+<file path=ppt/theme/theme2.xml><?xml version="1.0" encoding="utf-8"?>
+<a:theme xmlns:a="http://schemas.openxmlformats.org/drawingml/2006/main" name="Office Theme">
+  <a:themeElements>
+    <a:clrScheme name="Office">
+      <a:dk1>
+        <a:sysClr val="windowText" lastClr="000000"/>
+      </a:dk1>
+      <a:lt1>
+        <a:sysClr val="window" lastClr="FFFFFF"/>
+      </a:lt1>
+      <a:dk2>
+        <a:srgbClr val="44546A"/>
+      </a:dk2>
+      <a:lt2>
+        <a:srgbClr val="E7E6E6"/>
+      </a:lt2>
+      <a:accent1>
+        <a:srgbClr val="5B9BD5"/>
+      </a:accent1>
+      <a:accent2>
+        <a:srgbClr val="ED7D31"/>
+      </a:accent2>
+      <a:accent3>
+        <a:srgbClr val="A5A5A5"/>
+      </a:accent3>
+      <a:accent4>
+        <a:srgbClr val="FFC000"/>
+      </a:accent4>
+      <a:accent5>
+        <a:srgbClr val="4472C4"/>
+      </a:accent5>
+      <a:accent6>
+        <a:srgbClr val="70AD47"/>
+      </a:accent6>
+      <a:hlink>
+        <a:srgbClr val="0563C1"/>
+      </a:hlink>
+      <a:folHlink>
+        <a:srgbClr val="954F72"/>
+      </a:folHlink>
+    </a:clrScheme>
+    <a:fontScheme name="Office">
+      <a:majorFont>
+        <a:latin typeface="Calibri Light" panose="020F0302020204030204"/>
+        <a:ea typeface=""/>
+        <a:cs typeface=""/>
+        <a:font script="Jpan" typeface="游ゴシック Light"/>
+        <a:font script="Hang" typeface="맑은 고딕"/>
+        <a:font script="Hans" typeface="等线 Light"/>
+        <a:font script="Hant" typeface="新細明體"/>
+        <a:font script="Arab" typeface="Times New Roman"/>
+        <a:font script="Hebr" typeface="Times New Roman"/>
+        <a:font script="Thai" typeface="Angsana New"/>
+        <a:font script="Ethi" typeface="Nyala"/>
+        <a:font script="Beng" typeface="Vrinda"/>
+        <a:font script="Gujr" typeface="Shruti"/>
+        <a:font script="Khmr" typeface="MoolBoran"/>
+        <a:font script="Knda" typeface="Tunga"/>
+        <a:font script="Guru" typeface="Raavi"/>
+        <a:font script="Cans" typeface="Euphemia"/>
+        <a:font script="Cher" typeface="Plantagenet Cherokee"/>
+        <a:font script="Yiii" typeface="Microsoft Yi Baiti"/>
+        <a:font script="Tibt" typeface="Microsoft Himalaya"/>
+        <a:font script="Thaa" typeface="MV Boli"/>
+        <a:font script="Deva" typeface="Mangal"/>
+        <a:font script="Telu" typeface="Gautami"/>
+        <a:font script="Taml" typeface="Latha"/>
+        <a:font script="Syrc" typeface="Estrangelo Edessa"/>
+        <a:font script="Orya" typeface="Kalinga"/>
+        <a:font script="Mlym" typeface="Kartika"/>
+        <a:font script="Laoo" typeface="DokChampa"/>
+        <a:font script="Sinh" typeface="Iskoola Pota"/>
+        <a:font script="Mong" typeface="Mongolian Baiti"/>
+        <a:font script="Viet" typeface="Times New Roman"/>
+        <a:font script="Uigh" typeface="Microsoft Uighur"/>
+        <a:font script="Geor" typeface="Sylfaen"/>
+      </a:majorFont>
+      <a:minorFont>
+        <a:latin typeface="Calibri" panose="020F0502020204030204"/>
+        <a:ea typeface=""/>
+        <a:cs typeface=""/>
+        <a:font script="Jpan" typeface="游ゴシック"/>
+        <a:font script="Hang" typeface="맑은 고딕"/>
+        <a:font script="Hans" typeface="等线"/>
+        <a:font script="Hant" typeface="新細明體"/>
+        <a:font script="Arab" typeface="Arial"/>
+        <a:font script="Hebr" typeface="Arial"/>
+        <a:font script="Thai" typeface="Cordia New"/>
+        <a:font script="Ethi" typeface="Nyala"/>
+        <a:font script="Beng" typeface="Vrinda"/>
+        <a:font script="Gujr" typeface="Shruti"/>
+        <a:font script="Khmr" typeface="DaunPenh"/>
+        <a:font script="Knda" typeface="Tunga"/>
+        <a:font script="Guru" typeface="Raavi"/>
+        <a:font script="Cans" typeface="Euphemia"/>
+        <a:font script="Cher" typeface="Plantagenet Cherokee"/>
+        <a:font script="Yiii" typeface="Microsoft Yi Baiti"/>
+        <a:font script="Tibt" typeface="Microsoft Himalaya"/>
+        <a:font script="Thaa" typeface="MV Boli"/>
+        <a:font script="Deva" typeface="Mangal"/>
+        <a:font script="Telu" typeface="Gautami"/>
+        <a:font script="Taml" typeface="Latha"/>
+        <a:font script="Syrc" typeface="Estrangelo Edessa"/>
+        <a:font script="Orya" typeface="Kalinga"/>
+        <a:font script="Mlym" typeface="Kartika"/>
+        <a:font script="Laoo" typeface="DokChampa"/>
+        <a:font script="Sinh" typeface="Iskoola Pota"/>
+        <a:font script="Mong" typeface="Mongolian Baiti"/>
+        <a:font script="Viet" typeface="Arial"/>
+        <a:font script="Uigh" typeface="Microsoft Uighur"/>
+        <a:font script="Geor" typeface="Sylfaen"/>
+      </a:minorFont>
+    </a:fontScheme>
+    <a:fmtScheme name="Office">
+      <a:fillStyleLst>
+        <a:solidFill>
+          <a:schemeClr val="phClr"/>
+        </a:solidFill>
+        <a:gradFill rotWithShape="1">
+          <a:gsLst>
+            <a:gs pos="0">
+              <a:schemeClr val="phClr">
+                <a:lumMod val="110000"/>
+                <a:satMod val="105000"/>
+                <a:tint val="67000"/>
+              </a:schemeClr>
+            </a:gs>
+            <a:gs pos="50000">
+              <a:schemeClr val="phClr">
+                <a:lumMod val="105000"/>
+                <a:satMod val="103000"/>
+                <a:tint val="73000"/>
+              </a:schemeClr>
+            </a:gs>
+            <a:gs pos="100000">
+              <a:schemeClr val="phClr">
+                <a:lumMod val="105000"/>
+                <a:satMod val="109000"/>
+                <a:tint val="81000"/>
+              </a:schemeClr>
+            </a:gs>
+          </a:gsLst>
+          <a:lin ang="5400000" scaled="0"/>
+        </a:gradFill>
+        <a:gradFill rotWithShape="1">
+          <a:gsLst>
+            <a:gs pos="0">
+              <a:schemeClr val="phClr">
+                <a:satMod val="103000"/>
+                <a:lumMod val="102000"/>
+                <a:tint val="94000"/>
+              </a:schemeClr>
+            </a:gs>
+            <a:gs pos="50000">
+              <a:schemeClr val="phClr">
+                <a:satMod val="110000"/>
+                <a:lumMod val="100000"/>
+                <a:shade val="100000"/>
+              </a:schemeClr>
+            </a:gs>
+            <a:gs pos="100000">
+              <a:schemeClr val="phClr">
+                <a:lumMod val="99000"/>
+                <a:satMod val="120000"/>
+                <a:shade val="78000"/>
+              </a:schemeClr>
+            </a:gs>
+          </a:gsLst>
+          <a:lin ang="5400000" scaled="0"/>
+        </a:gradFill>
+      </a:fillStyleLst>
+      <a:lnStyleLst>
+        <a:ln w="6350" cap="flat" cmpd="sng" algn="ctr">
+          <a:solidFill>
+            <a:schemeClr val="phClr"/>
+          </a:solidFill>
+          <a:prstDash val="solid"/>
+          <a:miter lim="800000"/>
+        </a:ln>
+        <a:ln w="12700" cap="flat" cmpd="sng" algn="ctr">
+          <a:solidFill>
+            <a:schemeClr val="phClr"/>
+          </a:solidFill>
+          <a:prstDash val="solid"/>
+          <a:miter lim="800000"/>
+        </a:ln>
+        <a:ln w="19050" cap="flat" cmpd="sng" algn="ctr">
+          <a:solidFill>
+            <a:schemeClr val="phClr"/>
+          </a:solidFill>
+          <a:prstDash val="solid"/>
+          <a:miter lim="800000"/>
+        </a:ln>
+      </a:lnStyleLst>
+      <a:effectStyleLst>
+        <a:effectStyle>
+          <a:effectLst/>
+        </a:effectStyle>
+        <a:effectStyle>
+          <a:effectLst/>
+        </a:effectStyle>
+        <a:effectStyle>
+          <a:effectLst>
+            <a:outerShdw blurRad="57150" dist="19050" dir="5400000" algn="ctr" rotWithShape="0">
+              <a:srgbClr val="000000">
+                <a:alpha val="63000"/>
+              </a:srgbClr>
+            </a:outerShdw>
+          </a:effectLst>
+        </a:effectStyle>
+      </a:effectStyleLst>
+      <a:bgFillStyleLst>
+        <a:solidFill>
+          <a:schemeClr val="phClr"/>
+        </a:solidFill>
+        <a:solidFill>
+          <a:schemeClr val="phClr">
+            <a:tint val="95000"/>
+            <a:satMod val="170000"/>
+          </a:schemeClr>
+        </a:solidFill>
+        <a:gradFill rotWithShape="1">
+          <a:gsLst>
+            <a:gs pos="0">
+              <a:schemeClr val="phClr">
+                <a:tint val="93000"/>
+                <a:satMod val="150000"/>
+                <a:shade val="98000"/>
+                <a:lumMod val="102000"/>
+              </a:schemeClr>
+            </a:gs>
+            <a:gs pos="50000">
+              <a:schemeClr val="phClr">
+                <a:tint val="98000"/>
+                <a:satMod val="130000"/>
+                <a:shade val="90000"/>
+                <a:lumMod val="103000"/>
+              </a:schemeClr>
+            </a:gs>
+            <a:gs pos="100000">
+              <a:schemeClr val="phClr">
+                <a:shade val="63000"/>
+                <a:satMod val="120000"/>
+              </a:schemeClr>
+            </a:gs>
+          </a:gsLst>
+          <a:lin ang="5400000" scaled="0"/>
+        </a:gradFill>
+      </a:bgFillStyleLst>
+    </a:fmtScheme>
+  </a:themeElements>
+  <a:objectDefaults/>
+  <a:extraClrSchemeLst/>
+  <a:extLst>
+    <a:ext uri="{05A4C25C-085E-4340-85A3-A5531E510DB2}">
+      <thm15:themeFamily xmlns:thm15="http://schemas.microsoft.com/office/thememl/2012/main" name="Office Theme" id="{62F939B6-93AF-4DB8-9C6B-D6C7DFDC589F}" vid="{4A3C46E8-61CC-4603-A589-7422A47A8E4A}"/>
+    </a:ext>
+  </a:extLst>
+</a:theme>
+</file>
+
 <file path=customXml/item1.xml><?xml version="1.0" encoding="utf-8"?>
+<?mso-contentType ?>
+<FormTemplates xmlns="http://schemas.microsoft.com/sharepoint/v3/contenttype/forms">
+  <Display>DocumentLibraryForm</Display>
+  <Edit>DocumentLibraryForm</Edit>
+  <New>DocumentLibraryForm</New>
+</FormTemplates>
+</file>
+
+<file path=customXml/item2.xml><?xml version="1.0" encoding="utf-8"?>
+<p:properties xmlns:p="http://schemas.microsoft.com/office/2006/metadata/properties" xmlns:xsi="http://www.w3.org/2001/XMLSchema-instance" xmlns:pc="http://schemas.microsoft.com/office/infopath/2007/PartnerControls">
+  <documentManagement/>
+</p:properties>
+</file>
+
+<file path=customXml/item3.xml><?xml version="1.0" encoding="utf-8"?>
 <ct:contentTypeSchema xmlns:ct="http://schemas.microsoft.com/office/2006/metadata/contentType" xmlns:ma="http://schemas.microsoft.com/office/2006/metadata/properties/metaAttributes" ct:_="" ma:_="" ma:contentTypeName="Document" ma:contentTypeID="0x0101000C3F0734F22D774883C052A360730DF9" ma:contentTypeVersion="7" ma:contentTypeDescription="Create a new document." ma:contentTypeScope="" ma:versionID="68dbab044d50f9bfa9580c1de6249254">
   <xsd:schema xmlns:xsd="http://www.w3.org/2001/XMLSchema" xmlns:xs="http://www.w3.org/2001/XMLSchema" xmlns:p="http://schemas.microsoft.com/office/2006/metadata/properties" xmlns:ns3="c0477a94-a81b-4865-9707-6c9300ae147f" xmlns:ns4="45fda36c-df07-4f55-9922-29409b58d9d3" targetNamespace="http://schemas.microsoft.com/office/2006/metadata/properties" ma:root="true" ma:fieldsID="ea92a476c86701b878abbd8645c4be93" ns3:_="" ns4:_="">
     <xsd:import namespace="c0477a94-a81b-4865-9707-6c9300ae147f"/>
@@ -9047,36 +10350,10 @@
 </ct:contentTypeSchema>
 </file>
 
-<file path=customXml/item2.xml><?xml version="1.0" encoding="utf-8"?>
-<p:properties xmlns:p="http://schemas.microsoft.com/office/2006/metadata/properties" xmlns:xsi="http://www.w3.org/2001/XMLSchema-instance" xmlns:pc="http://schemas.microsoft.com/office/infopath/2007/PartnerControls">
-  <documentManagement/>
-</p:properties>
-</file>
-
-<file path=customXml/item3.xml><?xml version="1.0" encoding="utf-8"?>
-<?mso-contentType ?>
-<FormTemplates xmlns="http://schemas.microsoft.com/sharepoint/v3/contenttype/forms">
-  <Display>DocumentLibraryForm</Display>
-  <Edit>DocumentLibraryForm</Edit>
-  <New>DocumentLibraryForm</New>
-</FormTemplates>
-</file>
-
 <file path=customXml/itemProps1.xml><?xml version="1.0" encoding="utf-8"?>
-<ds:datastoreItem xmlns:ds="http://schemas.openxmlformats.org/officeDocument/2006/customXml" ds:itemID="{328FAD76-43D1-414B-B6EC-7811CDF23869}">
+<ds:datastoreItem xmlns:ds="http://schemas.openxmlformats.org/officeDocument/2006/customXml" ds:itemID="{10127F0B-EA07-4AFF-8549-55D4D4284DC4}">
   <ds:schemaRefs>
-    <ds:schemaRef ds:uri="http://schemas.microsoft.com/office/2006/metadata/contentType"/>
-    <ds:schemaRef ds:uri="http://schemas.microsoft.com/office/2006/metadata/properties/metaAttributes"/>
-    <ds:schemaRef ds:uri="http://www.w3.org/2001/XMLSchema"/>
-    <ds:schemaRef ds:uri="http://schemas.microsoft.com/office/2006/metadata/properties"/>
-    <ds:schemaRef ds:uri="c0477a94-a81b-4865-9707-6c9300ae147f"/>
-    <ds:schemaRef ds:uri="45fda36c-df07-4f55-9922-29409b58d9d3"/>
-    <ds:schemaRef ds:uri="http://schemas.microsoft.com/office/2006/documentManagement/types"/>
-    <ds:schemaRef ds:uri="http://schemas.microsoft.com/office/infopath/2007/PartnerControls"/>
-    <ds:schemaRef ds:uri="http://schemas.openxmlformats.org/package/2006/metadata/core-properties"/>
-    <ds:schemaRef ds:uri="http://purl.org/dc/elements/1.1/"/>
-    <ds:schemaRef ds:uri="http://purl.org/dc/terms/"/>
-    <ds:schemaRef ds:uri="http://schemas.microsoft.com/internal/obd"/>
+    <ds:schemaRef ds:uri="http://schemas.microsoft.com/sharepoint/v3/contenttype/forms"/>
   </ds:schemaRefs>
 </ds:datastoreItem>
 </file>
@@ -9099,9 +10376,20 @@
 </file>
 
 <file path=customXml/itemProps3.xml><?xml version="1.0" encoding="utf-8"?>
-<ds:datastoreItem xmlns:ds="http://schemas.openxmlformats.org/officeDocument/2006/customXml" ds:itemID="{10127F0B-EA07-4AFF-8549-55D4D4284DC4}">
+<ds:datastoreItem xmlns:ds="http://schemas.openxmlformats.org/officeDocument/2006/customXml" ds:itemID="{328FAD76-43D1-414B-B6EC-7811CDF23869}">
   <ds:schemaRefs>
-    <ds:schemaRef ds:uri="http://schemas.microsoft.com/sharepoint/v3/contenttype/forms"/>
+    <ds:schemaRef ds:uri="http://schemas.microsoft.com/office/2006/metadata/contentType"/>
+    <ds:schemaRef ds:uri="http://schemas.microsoft.com/office/2006/metadata/properties/metaAttributes"/>
+    <ds:schemaRef ds:uri="http://www.w3.org/2001/XMLSchema"/>
+    <ds:schemaRef ds:uri="http://schemas.microsoft.com/office/2006/metadata/properties"/>
+    <ds:schemaRef ds:uri="c0477a94-a81b-4865-9707-6c9300ae147f"/>
+    <ds:schemaRef ds:uri="45fda36c-df07-4f55-9922-29409b58d9d3"/>
+    <ds:schemaRef ds:uri="http://schemas.microsoft.com/office/2006/documentManagement/types"/>
+    <ds:schemaRef ds:uri="http://schemas.microsoft.com/office/infopath/2007/PartnerControls"/>
+    <ds:schemaRef ds:uri="http://schemas.openxmlformats.org/package/2006/metadata/core-properties"/>
+    <ds:schemaRef ds:uri="http://purl.org/dc/elements/1.1/"/>
+    <ds:schemaRef ds:uri="http://purl.org/dc/terms/"/>
+    <ds:schemaRef ds:uri="http://schemas.microsoft.com/internal/obd"/>
   </ds:schemaRefs>
 </ds:datastoreItem>
 </file>
</xml_diff>

<commit_message>
add examples and updated ppt
</commit_message>
<xml_diff>
--- a/VM_instructions.pptx
+++ b/VM_instructions.pptx
@@ -207,7 +207,7 @@
           <a:p>
             <a:fld id="{E23ADF96-BC0D-4C55-91BC-EF02308C332B}" type="datetimeFigureOut">
               <a:rPr lang="en-AU" smtClean="0"/>
-              <a:t>4/08/2020</a:t>
+              <a:t>5/08/2021</a:t>
             </a:fld>
             <a:endParaRPr lang="en-AU"/>
           </a:p>
@@ -646,7 +646,7 @@
           <a:p>
             <a:fld id="{A97D098C-81A2-4741-849D-B3F04101F1CD}" type="datetimeFigureOut">
               <a:rPr lang="en-AU" smtClean="0"/>
-              <a:t>4/08/2020</a:t>
+              <a:t>5/08/2021</a:t>
             </a:fld>
             <a:endParaRPr lang="en-AU"/>
           </a:p>
@@ -961,7 +961,7 @@
           <a:p>
             <a:fld id="{A97D098C-81A2-4741-849D-B3F04101F1CD}" type="datetimeFigureOut">
               <a:rPr lang="en-AU" smtClean="0"/>
-              <a:t>4/08/2020</a:t>
+              <a:t>5/08/2021</a:t>
             </a:fld>
             <a:endParaRPr lang="en-AU"/>
           </a:p>
@@ -1183,7 +1183,7 @@
           <a:p>
             <a:fld id="{A97D098C-81A2-4741-849D-B3F04101F1CD}" type="datetimeFigureOut">
               <a:rPr lang="en-AU" smtClean="0"/>
-              <a:t>4/08/2020</a:t>
+              <a:t>5/08/2021</a:t>
             </a:fld>
             <a:endParaRPr lang="en-AU"/>
           </a:p>
@@ -1474,7 +1474,7 @@
           <a:p>
             <a:fld id="{A97D098C-81A2-4741-849D-B3F04101F1CD}" type="datetimeFigureOut">
               <a:rPr lang="en-AU" smtClean="0"/>
-              <a:t>4/08/2020</a:t>
+              <a:t>5/08/2021</a:t>
             </a:fld>
             <a:endParaRPr lang="en-AU"/>
           </a:p>
@@ -1928,7 +1928,7 @@
           <a:p>
             <a:fld id="{A97D098C-81A2-4741-849D-B3F04101F1CD}" type="datetimeFigureOut">
               <a:rPr lang="en-AU" smtClean="0"/>
-              <a:t>4/08/2020</a:t>
+              <a:t>5/08/2021</a:t>
             </a:fld>
             <a:endParaRPr lang="en-AU"/>
           </a:p>
@@ -2504,7 +2504,7 @@
           <a:p>
             <a:fld id="{A97D098C-81A2-4741-849D-B3F04101F1CD}" type="datetimeFigureOut">
               <a:rPr lang="en-AU" smtClean="0"/>
-              <a:t>4/08/2020</a:t>
+              <a:t>5/08/2021</a:t>
             </a:fld>
             <a:endParaRPr lang="en-AU"/>
           </a:p>
@@ -3365,7 +3365,7 @@
           <a:p>
             <a:fld id="{A97D098C-81A2-4741-849D-B3F04101F1CD}" type="datetimeFigureOut">
               <a:rPr lang="en-AU" smtClean="0"/>
-              <a:t>4/08/2020</a:t>
+              <a:t>5/08/2021</a:t>
             </a:fld>
             <a:endParaRPr lang="en-AU"/>
           </a:p>
@@ -3570,7 +3570,7 @@
           <a:p>
             <a:fld id="{A97D098C-81A2-4741-849D-B3F04101F1CD}" type="datetimeFigureOut">
               <a:rPr lang="en-AU" smtClean="0"/>
-              <a:t>4/08/2020</a:t>
+              <a:t>5/08/2021</a:t>
             </a:fld>
             <a:endParaRPr lang="en-AU"/>
           </a:p>
@@ -3784,7 +3784,7 @@
           <a:p>
             <a:fld id="{A97D098C-81A2-4741-849D-B3F04101F1CD}" type="datetimeFigureOut">
               <a:rPr lang="en-AU" smtClean="0"/>
-              <a:t>4/08/2020</a:t>
+              <a:t>5/08/2021</a:t>
             </a:fld>
             <a:endParaRPr lang="en-AU"/>
           </a:p>
@@ -3989,7 +3989,7 @@
           <a:p>
             <a:fld id="{A97D098C-81A2-4741-849D-B3F04101F1CD}" type="datetimeFigureOut">
               <a:rPr lang="en-AU" smtClean="0"/>
-              <a:t>4/08/2020</a:t>
+              <a:t>5/08/2021</a:t>
             </a:fld>
             <a:endParaRPr lang="en-AU"/>
           </a:p>
@@ -4269,7 +4269,7 @@
           <a:p>
             <a:fld id="{A97D098C-81A2-4741-849D-B3F04101F1CD}" type="datetimeFigureOut">
               <a:rPr lang="en-AU" smtClean="0"/>
-              <a:t>4/08/2020</a:t>
+              <a:t>5/08/2021</a:t>
             </a:fld>
             <a:endParaRPr lang="en-AU"/>
           </a:p>
@@ -4536,7 +4536,7 @@
           <a:p>
             <a:fld id="{A97D098C-81A2-4741-849D-B3F04101F1CD}" type="datetimeFigureOut">
               <a:rPr lang="en-AU" smtClean="0"/>
-              <a:t>4/08/2020</a:t>
+              <a:t>5/08/2021</a:t>
             </a:fld>
             <a:endParaRPr lang="en-AU"/>
           </a:p>
@@ -4951,7 +4951,7 @@
           <a:p>
             <a:fld id="{A97D098C-81A2-4741-849D-B3F04101F1CD}" type="datetimeFigureOut">
               <a:rPr lang="en-AU" smtClean="0"/>
-              <a:t>4/08/2020</a:t>
+              <a:t>5/08/2021</a:t>
             </a:fld>
             <a:endParaRPr lang="en-AU"/>
           </a:p>
@@ -5099,7 +5099,7 @@
           <a:p>
             <a:fld id="{A97D098C-81A2-4741-849D-B3F04101F1CD}" type="datetimeFigureOut">
               <a:rPr lang="en-AU" smtClean="0"/>
-              <a:t>4/08/2020</a:t>
+              <a:t>5/08/2021</a:t>
             </a:fld>
             <a:endParaRPr lang="en-AU"/>
           </a:p>
@@ -5224,7 +5224,7 @@
           <a:p>
             <a:fld id="{A97D098C-81A2-4741-849D-B3F04101F1CD}" type="datetimeFigureOut">
               <a:rPr lang="en-AU" smtClean="0"/>
-              <a:t>4/08/2020</a:t>
+              <a:t>5/08/2021</a:t>
             </a:fld>
             <a:endParaRPr lang="en-AU"/>
           </a:p>
@@ -5503,7 +5503,7 @@
           <a:p>
             <a:fld id="{A97D098C-81A2-4741-849D-B3F04101F1CD}" type="datetimeFigureOut">
               <a:rPr lang="en-AU" smtClean="0"/>
-              <a:t>4/08/2020</a:t>
+              <a:t>5/08/2021</a:t>
             </a:fld>
             <a:endParaRPr lang="en-AU"/>
           </a:p>
@@ -5818,7 +5818,7 @@
           <a:p>
             <a:fld id="{A97D098C-81A2-4741-849D-B3F04101F1CD}" type="datetimeFigureOut">
               <a:rPr lang="en-AU" smtClean="0"/>
-              <a:t>4/08/2020</a:t>
+              <a:t>5/08/2021</a:t>
             </a:fld>
             <a:endParaRPr lang="en-AU"/>
           </a:p>
@@ -6071,7 +6071,7 @@
           <a:p>
             <a:fld id="{A97D098C-81A2-4741-849D-B3F04101F1CD}" type="datetimeFigureOut">
               <a:rPr lang="en-AU" smtClean="0"/>
-              <a:t>4/08/2020</a:t>
+              <a:t>5/08/2021</a:t>
             </a:fld>
             <a:endParaRPr lang="en-AU"/>
           </a:p>
@@ -7999,19 +7999,8 @@
                 <a:latin typeface="Lucida Sans" panose="020B0602030504020204" pitchFamily="34" charset="0"/>
                 <a:cs typeface="Arial" panose="020B0604020202020204" pitchFamily="34" charset="0"/>
               </a:rPr>
-              <a:t> </a:t>
-            </a:r>
-            <a:r>
-              <a:rPr lang="en-AU" dirty="0" smtClean="0">
-                <a:latin typeface="Lucida Sans" panose="020B0602030504020204" pitchFamily="34" charset="0"/>
-                <a:cs typeface="Arial" panose="020B0604020202020204" pitchFamily="34" charset="0"/>
-              </a:rPr>
-              <a:t>cits5507</a:t>
-            </a:r>
-            <a:endParaRPr lang="en-AU" dirty="0" smtClean="0">
-              <a:latin typeface="Lucida Sans" panose="020B0602030504020204" pitchFamily="34" charset="0"/>
-              <a:cs typeface="Arial" panose="020B0604020202020204" pitchFamily="34" charset="0"/>
-            </a:endParaRPr>
+              <a:t> cits5507</a:t>
+            </a:r>
           </a:p>
           <a:p>
             <a:pPr marL="285750" indent="-285750">
@@ -8081,19 +8070,8 @@
                 <a:latin typeface="Lucida Sans" panose="020B0602030504020204" pitchFamily="34" charset="0"/>
                 <a:cs typeface="Arial" panose="020B0604020202020204" pitchFamily="34" charset="0"/>
               </a:rPr>
-              <a:t> </a:t>
-            </a:r>
-            <a:r>
-              <a:rPr lang="en-AU" dirty="0" smtClean="0">
-                <a:latin typeface="Lucida Sans" panose="020B0602030504020204" pitchFamily="34" charset="0"/>
-                <a:cs typeface="Arial" panose="020B0604020202020204" pitchFamily="34" charset="0"/>
-              </a:rPr>
-              <a:t>cits5507</a:t>
-            </a:r>
-            <a:endParaRPr lang="en-AU" dirty="0" smtClean="0">
-              <a:latin typeface="Lucida Sans" panose="020B0602030504020204" pitchFamily="34" charset="0"/>
-              <a:cs typeface="Arial" panose="020B0604020202020204" pitchFamily="34" charset="0"/>
-            </a:endParaRPr>
+              <a:t> cits5507</a:t>
+            </a:r>
           </a:p>
           <a:p>
             <a:pPr marL="285750" indent="-285750">
@@ -8111,43 +8089,29 @@
                 <a:latin typeface="Arial" panose="020B0604020202020204" pitchFamily="34" charset="0"/>
                 <a:cs typeface="Arial" panose="020B0604020202020204" pitchFamily="34" charset="0"/>
               </a:rPr>
-              <a:t>To make </a:t>
-            </a:r>
+              <a:t>To make cits5507 directory the working directory, use the command “cd” </a:t>
+            </a:r>
+          </a:p>
+          <a:p>
             <a:r>
               <a:rPr lang="en-AU" dirty="0" smtClean="0">
                 <a:latin typeface="Arial" panose="020B0604020202020204" pitchFamily="34" charset="0"/>
                 <a:cs typeface="Arial" panose="020B0604020202020204" pitchFamily="34" charset="0"/>
               </a:rPr>
-              <a:t>cits5507 </a:t>
+              <a:t>it is the same for Windows and </a:t>
+            </a:r>
+            <a:r>
+              <a:rPr lang="en-AU" dirty="0" err="1" smtClean="0">
+                <a:latin typeface="Arial" panose="020B0604020202020204" pitchFamily="34" charset="0"/>
+                <a:cs typeface="Arial" panose="020B0604020202020204" pitchFamily="34" charset="0"/>
+              </a:rPr>
+              <a:t>MacOS</a:t>
             </a:r>
             <a:r>
               <a:rPr lang="en-AU" dirty="0" smtClean="0">
                 <a:latin typeface="Arial" panose="020B0604020202020204" pitchFamily="34" charset="0"/>
                 <a:cs typeface="Arial" panose="020B0604020202020204" pitchFamily="34" charset="0"/>
               </a:rPr>
-              <a:t>directory the working directory, use the command “cd” </a:t>
-            </a:r>
-          </a:p>
-          <a:p>
-            <a:r>
-              <a:rPr lang="en-AU" dirty="0" smtClean="0">
-                <a:latin typeface="Arial" panose="020B0604020202020204" pitchFamily="34" charset="0"/>
-                <a:cs typeface="Arial" panose="020B0604020202020204" pitchFamily="34" charset="0"/>
-              </a:rPr>
-              <a:t>it is the same for Windows and </a:t>
-            </a:r>
-            <a:r>
-              <a:rPr lang="en-AU" dirty="0" err="1" smtClean="0">
-                <a:latin typeface="Arial" panose="020B0604020202020204" pitchFamily="34" charset="0"/>
-                <a:cs typeface="Arial" panose="020B0604020202020204" pitchFamily="34" charset="0"/>
-              </a:rPr>
-              <a:t>MacOS</a:t>
-            </a:r>
-            <a:r>
-              <a:rPr lang="en-AU" dirty="0" smtClean="0">
-                <a:latin typeface="Arial" panose="020B0604020202020204" pitchFamily="34" charset="0"/>
-                <a:cs typeface="Arial" panose="020B0604020202020204" pitchFamily="34" charset="0"/>
-              </a:rPr>
               <a:t> </a:t>
             </a:r>
           </a:p>
@@ -8158,19 +8122,8 @@
                 <a:latin typeface="Lucida Sans" panose="020B0602030504020204" pitchFamily="34" charset="0"/>
                 <a:cs typeface="Arial" panose="020B0604020202020204" pitchFamily="34" charset="0"/>
               </a:rPr>
-              <a:t>% cd </a:t>
-            </a:r>
-            <a:r>
-              <a:rPr lang="en-AU" dirty="0" smtClean="0">
-                <a:latin typeface="Lucida Sans" panose="020B0602030504020204" pitchFamily="34" charset="0"/>
-                <a:cs typeface="Arial" panose="020B0604020202020204" pitchFamily="34" charset="0"/>
-              </a:rPr>
-              <a:t>cits5507</a:t>
-            </a:r>
-            <a:endParaRPr lang="en-AU" dirty="0" smtClean="0">
-              <a:latin typeface="Lucida Sans" panose="020B0602030504020204" pitchFamily="34" charset="0"/>
-              <a:cs typeface="Arial" panose="020B0604020202020204" pitchFamily="34" charset="0"/>
-            </a:endParaRPr>
+              <a:t>% cd cits5507</a:t>
+            </a:r>
           </a:p>
           <a:p>
             <a:endParaRPr lang="en-AU" dirty="0" smtClean="0"/>
@@ -8300,7 +8253,15 @@
                 <a:cs typeface="Arial" panose="020B0604020202020204" pitchFamily="34" charset="0"/>
                 <a:hlinkClick r:id="rId2"/>
               </a:rPr>
-              <a:t>https://github.com/chrisbpawsey/HPC.git</a:t>
+              <a:t>https://</a:t>
+            </a:r>
+            <a:r>
+              <a:rPr lang="en-AU" dirty="0" smtClean="0">
+                <a:latin typeface="Lucida Sans" panose="020B0602030504020204" pitchFamily="34" charset="0"/>
+                <a:cs typeface="Arial" panose="020B0604020202020204" pitchFamily="34" charset="0"/>
+                <a:hlinkClick r:id="rId2"/>
+              </a:rPr>
+              <a:t>github.com/chrisbuwahpc/HPC.git</a:t>
             </a:r>
             <a:endParaRPr lang="en-AU" dirty="0" smtClean="0">
               <a:latin typeface="Lucida Sans" panose="020B0602030504020204" pitchFamily="34" charset="0"/>
@@ -8485,21 +8446,7 @@
                 <a:latin typeface="Arial" panose="020B0604020202020204" pitchFamily="34" charset="0"/>
                 <a:cs typeface="Arial" panose="020B0604020202020204" pitchFamily="34" charset="0"/>
               </a:rPr>
-              <a:t>Step 3: change director into the </a:t>
-            </a:r>
-            <a:r>
-              <a:rPr lang="en-AU" dirty="0" smtClean="0">
-                <a:latin typeface="Arial" panose="020B0604020202020204" pitchFamily="34" charset="0"/>
-                <a:cs typeface="Arial" panose="020B0604020202020204" pitchFamily="34" charset="0"/>
-              </a:rPr>
-              <a:t>cits5507/HPC </a:t>
-            </a:r>
-            <a:r>
-              <a:rPr lang="en-AU" dirty="0" smtClean="0">
-                <a:latin typeface="Arial" panose="020B0604020202020204" pitchFamily="34" charset="0"/>
-                <a:cs typeface="Arial" panose="020B0604020202020204" pitchFamily="34" charset="0"/>
-              </a:rPr>
-              <a:t>directory</a:t>
+              <a:t>Step 3: change director into the cits5507/HPC directory</a:t>
             </a:r>
           </a:p>
           <a:p>
@@ -8687,8 +8634,10 @@
                 <a:latin typeface="Arial" panose="020B0604020202020204" pitchFamily="34" charset="0"/>
                 <a:cs typeface="Arial" panose="020B0604020202020204" pitchFamily="34" charset="0"/>
               </a:rPr>
-              <a:t>Coffee Break</a:t>
-            </a:r>
+              <a:t>Coffee Break: </a:t>
+            </a:r>
+          </a:p>
+          <a:p>
             <a:r>
               <a:rPr lang="en-AU" dirty="0" smtClean="0">
                 <a:solidFill>
@@ -8697,17 +8646,48 @@
                 <a:latin typeface="Arial" panose="020B0604020202020204" pitchFamily="34" charset="0"/>
                 <a:cs typeface="Arial" panose="020B0604020202020204" pitchFamily="34" charset="0"/>
               </a:rPr>
-              <a:t>: </a:t>
-            </a:r>
-            <a:endParaRPr lang="en-AU" dirty="0" smtClean="0">
-              <a:solidFill>
-                <a:srgbClr val="FF0000"/>
-              </a:solidFill>
-              <a:latin typeface="Arial" panose="020B0604020202020204" pitchFamily="34" charset="0"/>
-              <a:cs typeface="Arial" panose="020B0604020202020204" pitchFamily="34" charset="0"/>
-            </a:endParaRPr>
-          </a:p>
-          <a:p>
+              <a:t>This </a:t>
+            </a:r>
+            <a:r>
+              <a:rPr lang="en-AU" b="1" dirty="0" smtClean="0">
+                <a:solidFill>
+                  <a:srgbClr val="FF0000"/>
+                </a:solidFill>
+                <a:latin typeface="Arial" panose="020B0604020202020204" pitchFamily="34" charset="0"/>
+                <a:cs typeface="Arial" panose="020B0604020202020204" pitchFamily="34" charset="0"/>
+              </a:rPr>
+              <a:t>can take up to </a:t>
+            </a:r>
+            <a:r>
+              <a:rPr lang="en-AU" b="1" dirty="0" smtClean="0">
+                <a:solidFill>
+                  <a:srgbClr val="FF0000"/>
+                </a:solidFill>
+                <a:latin typeface="Arial" panose="020B0604020202020204" pitchFamily="34" charset="0"/>
+                <a:cs typeface="Arial" panose="020B0604020202020204" pitchFamily="34" charset="0"/>
+              </a:rPr>
+              <a:t>15</a:t>
+            </a:r>
+            <a:r>
+              <a:rPr lang="en-AU" b="1" dirty="0" smtClean="0">
+                <a:solidFill>
+                  <a:srgbClr val="FF0000"/>
+                </a:solidFill>
+                <a:latin typeface="Arial" panose="020B0604020202020204" pitchFamily="34" charset="0"/>
+                <a:cs typeface="Arial" panose="020B0604020202020204" pitchFamily="34" charset="0"/>
+              </a:rPr>
+              <a:t> </a:t>
+            </a:r>
+            <a:r>
+              <a:rPr lang="en-AU" b="1" dirty="0" smtClean="0">
+                <a:solidFill>
+                  <a:srgbClr val="FF0000"/>
+                </a:solidFill>
+                <a:latin typeface="Arial" panose="020B0604020202020204" pitchFamily="34" charset="0"/>
+                <a:cs typeface="Arial" panose="020B0604020202020204" pitchFamily="34" charset="0"/>
+              </a:rPr>
+              <a:t>minutes</a:t>
+            </a:r>
             <a:r>
               <a:rPr lang="en-AU" dirty="0" smtClean="0">
                 <a:solidFill>
@@ -8716,37 +8696,7 @@
                 <a:latin typeface="Arial" panose="020B0604020202020204" pitchFamily="34" charset="0"/>
                 <a:cs typeface="Arial" panose="020B0604020202020204" pitchFamily="34" charset="0"/>
               </a:rPr>
-              <a:t>This </a:t>
-            </a:r>
-            <a:r>
-              <a:rPr lang="en-AU" b="1" dirty="0" smtClean="0">
-                <a:solidFill>
-                  <a:srgbClr val="FF0000"/>
-                </a:solidFill>
-                <a:latin typeface="Arial" panose="020B0604020202020204" pitchFamily="34" charset="0"/>
-                <a:cs typeface="Arial" panose="020B0604020202020204" pitchFamily="34" charset="0"/>
-              </a:rPr>
-              <a:t>can take up to 30 minutes</a:t>
-            </a:r>
-            <a:r>
-              <a:rPr lang="en-AU" dirty="0" smtClean="0">
-                <a:solidFill>
-                  <a:srgbClr val="FF0000"/>
-                </a:solidFill>
-                <a:latin typeface="Arial" panose="020B0604020202020204" pitchFamily="34" charset="0"/>
-                <a:cs typeface="Arial" panose="020B0604020202020204" pitchFamily="34" charset="0"/>
-              </a:rPr>
-              <a:t> </a:t>
-            </a:r>
-            <a:r>
-              <a:rPr lang="en-AU" dirty="0" smtClean="0">
-                <a:solidFill>
-                  <a:srgbClr val="FF0000"/>
-                </a:solidFill>
-                <a:latin typeface="Arial" panose="020B0604020202020204" pitchFamily="34" charset="0"/>
-                <a:cs typeface="Arial" panose="020B0604020202020204" pitchFamily="34" charset="0"/>
-              </a:rPr>
-              <a:t>as it automatically downloading and configuring the base Ubuntu OS image that is used for your VM</a:t>
+              <a:t> as it automatically downloading and configuring the base Ubuntu OS image that is used for your VM</a:t>
             </a:r>
             <a:r>
               <a:rPr lang="en-AU" dirty="0" smtClean="0">
@@ -8872,219 +8822,6 @@
       </p:sp>
       <p:sp>
         <p:nvSpPr>
-          <p:cNvPr id="4" name="TextBox 3"/>
-          <p:cNvSpPr txBox="1"/>
-          <p:nvPr/>
-        </p:nvSpPr>
-        <p:spPr>
-          <a:xfrm>
-            <a:off x="1382805" y="2337019"/>
-            <a:ext cx="9426389" cy="4062651"/>
-          </a:xfrm>
-          <a:prstGeom prst="rect">
-            <a:avLst/>
-          </a:prstGeom>
-          <a:noFill/>
-        </p:spPr>
-        <p:txBody>
-          <a:bodyPr wrap="square" rtlCol="0">
-            <a:spAutoFit/>
-          </a:bodyPr>
-          <a:lstStyle/>
-          <a:p>
-            <a:r>
-              <a:rPr lang="en-AU" dirty="0" smtClean="0">
-                <a:latin typeface="Arial" panose="020B0604020202020204" pitchFamily="34" charset="0"/>
-                <a:cs typeface="Arial" panose="020B0604020202020204" pitchFamily="34" charset="0"/>
-              </a:rPr>
-              <a:t>Step 4a: Run the install script “setup.sh” that has been copied into your home directory of your Virtual Machine! </a:t>
-            </a:r>
-          </a:p>
-          <a:p>
-            <a:pPr lvl="1"/>
-            <a:r>
-              <a:rPr lang="en-AU" dirty="0" smtClean="0">
-                <a:latin typeface="Lucida Sans" panose="020B0602030504020204" pitchFamily="34" charset="0"/>
-              </a:rPr>
-              <a:t>% ./setup.sh</a:t>
-            </a:r>
-          </a:p>
-          <a:p>
-            <a:r>
-              <a:rPr lang="en-AU" b="1" dirty="0" smtClean="0">
-                <a:solidFill>
-                  <a:srgbClr val="FF0000"/>
-                </a:solidFill>
-              </a:rPr>
-              <a:t>COFFEE BREAK:</a:t>
-            </a:r>
-            <a:endParaRPr lang="en-AU" b="1" dirty="0">
-              <a:solidFill>
-                <a:srgbClr val="FF0000"/>
-              </a:solidFill>
-            </a:endParaRPr>
-          </a:p>
-          <a:p>
-            <a:r>
-              <a:rPr lang="en-AU" dirty="0" smtClean="0">
-                <a:solidFill>
-                  <a:srgbClr val="FF0000"/>
-                </a:solidFill>
-                <a:latin typeface="Arial" panose="020B0604020202020204" pitchFamily="34" charset="0"/>
-                <a:cs typeface="Arial" panose="020B0604020202020204" pitchFamily="34" charset="0"/>
-              </a:rPr>
-              <a:t>This </a:t>
-            </a:r>
-            <a:r>
-              <a:rPr lang="en-AU" b="1" dirty="0" smtClean="0">
-                <a:solidFill>
-                  <a:srgbClr val="FF0000"/>
-                </a:solidFill>
-                <a:latin typeface="Arial" panose="020B0604020202020204" pitchFamily="34" charset="0"/>
-                <a:cs typeface="Arial" panose="020B0604020202020204" pitchFamily="34" charset="0"/>
-              </a:rPr>
-              <a:t>can take up to 30 minutes</a:t>
-            </a:r>
-            <a:r>
-              <a:rPr lang="en-AU" dirty="0" smtClean="0">
-                <a:solidFill>
-                  <a:srgbClr val="FF0000"/>
-                </a:solidFill>
-                <a:latin typeface="Arial" panose="020B0604020202020204" pitchFamily="34" charset="0"/>
-                <a:cs typeface="Arial" panose="020B0604020202020204" pitchFamily="34" charset="0"/>
-              </a:rPr>
-              <a:t> </a:t>
-            </a:r>
-            <a:r>
-              <a:rPr lang="en-AU" dirty="0" smtClean="0">
-                <a:solidFill>
-                  <a:srgbClr val="FF0000"/>
-                </a:solidFill>
-                <a:latin typeface="Arial" panose="020B0604020202020204" pitchFamily="34" charset="0"/>
-                <a:cs typeface="Arial" panose="020B0604020202020204" pitchFamily="34" charset="0"/>
-              </a:rPr>
-              <a:t>to complete! Depending on your laptop processor speed.  </a:t>
-            </a:r>
-          </a:p>
-          <a:p>
-            <a:r>
-              <a:rPr lang="en-AU" dirty="0" smtClean="0">
-                <a:solidFill>
-                  <a:srgbClr val="FF0000"/>
-                </a:solidFill>
-                <a:latin typeface="Arial" panose="020B0604020202020204" pitchFamily="34" charset="0"/>
-                <a:cs typeface="Arial" panose="020B0604020202020204" pitchFamily="34" charset="0"/>
-              </a:rPr>
-              <a:t>Go get a coffee!  If you do work on your laptop or surf the net it will just take longer!</a:t>
-            </a:r>
-          </a:p>
-          <a:p>
-            <a:endParaRPr lang="en-AU" dirty="0" smtClean="0">
-              <a:latin typeface="Arial" panose="020B0604020202020204" pitchFamily="34" charset="0"/>
-              <a:cs typeface="Arial" panose="020B0604020202020204" pitchFamily="34" charset="0"/>
-            </a:endParaRPr>
-          </a:p>
-          <a:p>
-            <a:r>
-              <a:rPr lang="en-AU" sz="2400" b="1" i="1" dirty="0" smtClean="0">
-                <a:solidFill>
-                  <a:schemeClr val="accent2">
-                    <a:lumMod val="60000"/>
-                    <a:lumOff val="40000"/>
-                  </a:schemeClr>
-                </a:solidFill>
-                <a:latin typeface="Arial" panose="020B0604020202020204" pitchFamily="34" charset="0"/>
-                <a:cs typeface="Arial" panose="020B0604020202020204" pitchFamily="34" charset="0"/>
-              </a:rPr>
-              <a:t>Good news</a:t>
-            </a:r>
-            <a:r>
-              <a:rPr lang="en-AU" b="1" i="1" dirty="0" smtClean="0">
-                <a:solidFill>
-                  <a:schemeClr val="accent2">
-                    <a:lumMod val="60000"/>
-                    <a:lumOff val="40000"/>
-                  </a:schemeClr>
-                </a:solidFill>
-                <a:latin typeface="Arial" panose="020B0604020202020204" pitchFamily="34" charset="0"/>
-                <a:cs typeface="Arial" panose="020B0604020202020204" pitchFamily="34" charset="0"/>
-              </a:rPr>
-              <a:t> is you only need to do this ONCE when you first create the VM.</a:t>
-            </a:r>
-          </a:p>
-          <a:p>
-            <a:endParaRPr lang="en-AU" dirty="0">
-              <a:latin typeface="Arial" panose="020B0604020202020204" pitchFamily="34" charset="0"/>
-              <a:cs typeface="Arial" panose="020B0604020202020204" pitchFamily="34" charset="0"/>
-            </a:endParaRPr>
-          </a:p>
-          <a:p>
-            <a:r>
-              <a:rPr lang="en-AU" dirty="0" smtClean="0">
-                <a:latin typeface="Arial" panose="020B0604020202020204" pitchFamily="34" charset="0"/>
-                <a:cs typeface="Arial" panose="020B0604020202020204" pitchFamily="34" charset="0"/>
-              </a:rPr>
-              <a:t>Step 4b: To ensure that you correctly pickup all the changes to your environment the simplest thing to do</a:t>
-            </a:r>
-            <a:r>
-              <a:rPr lang="en-AU" dirty="0">
-                <a:latin typeface="Arial" panose="020B0604020202020204" pitchFamily="34" charset="0"/>
-                <a:cs typeface="Arial" panose="020B0604020202020204" pitchFamily="34" charset="0"/>
-              </a:rPr>
-              <a:t> i</a:t>
-            </a:r>
-            <a:r>
-              <a:rPr lang="en-AU" dirty="0" smtClean="0">
-                <a:latin typeface="Arial" panose="020B0604020202020204" pitchFamily="34" charset="0"/>
-                <a:cs typeface="Arial" panose="020B0604020202020204" pitchFamily="34" charset="0"/>
-              </a:rPr>
-              <a:t>s log out and log back in to the VM</a:t>
-            </a:r>
-          </a:p>
-          <a:p>
-            <a:pPr lvl="1"/>
-            <a:r>
-              <a:rPr lang="en-AU" dirty="0" smtClean="0">
-                <a:latin typeface="Lucida Sans" panose="020B0602030504020204" pitchFamily="34" charset="0"/>
-                <a:cs typeface="Arial" panose="020B0604020202020204" pitchFamily="34" charset="0"/>
-              </a:rPr>
-              <a:t>% exit</a:t>
-            </a:r>
-          </a:p>
-          <a:p>
-            <a:r>
-              <a:rPr lang="en-AU" dirty="0" smtClean="0">
-                <a:latin typeface="Arial" panose="020B0604020202020204" pitchFamily="34" charset="0"/>
-                <a:cs typeface="Arial" panose="020B0604020202020204" pitchFamily="34" charset="0"/>
-              </a:rPr>
-              <a:t>Log back in to the VM.</a:t>
-            </a:r>
-          </a:p>
-          <a:p>
-            <a:pPr lvl="1"/>
-            <a:r>
-              <a:rPr lang="en-AU" dirty="0" smtClean="0">
-                <a:latin typeface="Lucida Sans" panose="020B0602030504020204" pitchFamily="34" charset="0"/>
-                <a:cs typeface="Arial" panose="020B0604020202020204" pitchFamily="34" charset="0"/>
-              </a:rPr>
-              <a:t>% vagrant </a:t>
-            </a:r>
-            <a:r>
-              <a:rPr lang="en-AU" dirty="0" err="1" smtClean="0">
-                <a:latin typeface="Lucida Sans" panose="020B0602030504020204" pitchFamily="34" charset="0"/>
-                <a:cs typeface="Arial" panose="020B0604020202020204" pitchFamily="34" charset="0"/>
-              </a:rPr>
-              <a:t>ssh</a:t>
-            </a:r>
-            <a:endParaRPr lang="en-AU" dirty="0" smtClean="0">
-              <a:latin typeface="Lucida Sans" panose="020B0602030504020204" pitchFamily="34" charset="0"/>
-              <a:cs typeface="Arial" panose="020B0604020202020204" pitchFamily="34" charset="0"/>
-            </a:endParaRPr>
-          </a:p>
-        </p:txBody>
-      </p:sp>
-      <p:sp>
-        <p:nvSpPr>
           <p:cNvPr id="5" name="TextBox 4"/>
           <p:cNvSpPr txBox="1"/>
           <p:nvPr/>
@@ -9233,7 +8970,7 @@
         <p:spPr>
           <a:xfrm>
             <a:off x="1231490" y="1690688"/>
-            <a:ext cx="9400488" cy="4247317"/>
+            <a:ext cx="9400488" cy="2862322"/>
           </a:xfrm>
           <a:prstGeom prst="rect">
             <a:avLst/>
@@ -9281,19 +9018,8 @@
                 <a:latin typeface="Lucida Sans Typewriter" panose="020B0509030504030204" pitchFamily="49" charset="0"/>
                 <a:cs typeface="Arial" panose="020B0604020202020204" pitchFamily="34" charset="0"/>
               </a:rPr>
-              <a:t> </a:t>
-            </a:r>
-            <a:r>
-              <a:rPr lang="en-AU" dirty="0" smtClean="0">
-                <a:latin typeface="Lucida Sans Typewriter" panose="020B0509030504030204" pitchFamily="49" charset="0"/>
-                <a:cs typeface="Arial" panose="020B0604020202020204" pitchFamily="34" charset="0"/>
-              </a:rPr>
-              <a:t>cits5507</a:t>
-            </a:r>
-            <a:endParaRPr lang="en-AU" dirty="0" smtClean="0">
-              <a:latin typeface="Lucida Sans Typewriter" panose="020B0509030504030204" pitchFamily="49" charset="0"/>
-              <a:cs typeface="Arial" panose="020B0604020202020204" pitchFamily="34" charset="0"/>
-            </a:endParaRPr>
+              <a:t> cits5507</a:t>
+            </a:r>
           </a:p>
           <a:p>
             <a:pPr marL="742950" lvl="1" indent="-285750">
@@ -9305,19 +9031,8 @@
                 <a:latin typeface="Lucida Sans Typewriter" panose="020B0509030504030204" pitchFamily="49" charset="0"/>
                 <a:cs typeface="Arial" panose="020B0604020202020204" pitchFamily="34" charset="0"/>
               </a:rPr>
-              <a:t>cd </a:t>
-            </a:r>
-            <a:r>
-              <a:rPr lang="en-AU" dirty="0" smtClean="0">
-                <a:latin typeface="Lucida Sans Typewriter" panose="020B0509030504030204" pitchFamily="49" charset="0"/>
-                <a:cs typeface="Arial" panose="020B0604020202020204" pitchFamily="34" charset="0"/>
-              </a:rPr>
-              <a:t>cits5507</a:t>
-            </a:r>
-            <a:endParaRPr lang="en-AU" dirty="0" smtClean="0">
-              <a:latin typeface="Lucida Sans Typewriter" panose="020B0509030504030204" pitchFamily="49" charset="0"/>
-              <a:cs typeface="Arial" panose="020B0604020202020204" pitchFamily="34" charset="0"/>
-            </a:endParaRPr>
+              <a:t>cd cits5507</a:t>
+            </a:r>
           </a:p>
           <a:p>
             <a:r>
@@ -9359,8 +9074,26 @@
                 <a:latin typeface="Lucida Sans Typewriter" panose="020B0509030504030204" pitchFamily="49" charset="0"/>
                 <a:cs typeface="Arial" panose="020B0604020202020204" pitchFamily="34" charset="0"/>
               </a:rPr>
-              <a:t>git clone https://github.com/chrisbpawsey/HPC.git</a:t>
-            </a:r>
+              <a:t>git clone https</a:t>
+            </a:r>
+            <a:r>
+              <a:rPr lang="en-AU" smtClean="0">
+                <a:latin typeface="Lucida Sans Typewriter" panose="020B0509030504030204" pitchFamily="49" charset="0"/>
+                <a:cs typeface="Arial" panose="020B0604020202020204" pitchFamily="34" charset="0"/>
+              </a:rPr>
+              <a:t>://</a:t>
+            </a:r>
+            <a:r>
+              <a:rPr lang="en-AU" smtClean="0">
+                <a:latin typeface="Lucida Sans Typewriter" panose="020B0509030504030204" pitchFamily="49" charset="0"/>
+                <a:cs typeface="Arial" panose="020B0604020202020204" pitchFamily="34" charset="0"/>
+              </a:rPr>
+              <a:t>github.com/chrisbuwahpc/HPC.git</a:t>
+            </a:r>
+            <a:endParaRPr lang="en-AU" dirty="0" smtClean="0">
+              <a:latin typeface="Lucida Sans Typewriter" panose="020B0509030504030204" pitchFamily="49" charset="0"/>
+              <a:cs typeface="Arial" panose="020B0604020202020204" pitchFamily="34" charset="0"/>
+            </a:endParaRPr>
           </a:p>
           <a:p>
             <a:r>
@@ -9404,14 +9137,7 @@
                 <a:latin typeface="Lucida Sans Typewriter" panose="020B0509030504030204" pitchFamily="49" charset="0"/>
                 <a:cs typeface="Arial" panose="020B0604020202020204" pitchFamily="34" charset="0"/>
               </a:rPr>
-              <a:t>vagrant </a:t>
-            </a:r>
-            <a:r>
-              <a:rPr lang="en-AU" dirty="0" smtClean="0">
-                <a:latin typeface="Lucida Sans Typewriter" panose="020B0509030504030204" pitchFamily="49" charset="0"/>
-                <a:cs typeface="Arial" panose="020B0604020202020204" pitchFamily="34" charset="0"/>
-              </a:rPr>
-              <a:t>up     </a:t>
+              <a:t>vagrant up     </a:t>
             </a:r>
             <a:r>
               <a:rPr lang="en-AU" dirty="0" smtClean="0">
@@ -9431,7 +9157,7 @@
                 <a:latin typeface="Lucida Sans Typewriter" panose="020B0509030504030204" pitchFamily="49" charset="0"/>
                 <a:cs typeface="Arial" panose="020B0604020202020204" pitchFamily="34" charset="0"/>
               </a:rPr>
-              <a:t>note this can take up to 30 </a:t>
+              <a:t>note this can take up to </a:t>
             </a:r>
             <a:r>
               <a:rPr lang="en-AU" dirty="0" smtClean="0">
@@ -9441,6 +9167,26 @@
                 <a:latin typeface="Lucida Sans Typewriter" panose="020B0509030504030204" pitchFamily="49" charset="0"/>
                 <a:cs typeface="Arial" panose="020B0604020202020204" pitchFamily="34" charset="0"/>
               </a:rPr>
+              <a:t>15</a:t>
+            </a:r>
+            <a:r>
+              <a:rPr lang="en-AU" dirty="0" smtClean="0">
+                <a:solidFill>
+                  <a:srgbClr val="FF0000"/>
+                </a:solidFill>
+                <a:latin typeface="Lucida Sans Typewriter" panose="020B0509030504030204" pitchFamily="49" charset="0"/>
+                <a:cs typeface="Arial" panose="020B0604020202020204" pitchFamily="34" charset="0"/>
+              </a:rPr>
+              <a:t> </a:t>
+            </a:r>
+            <a:r>
+              <a:rPr lang="en-AU" dirty="0" smtClean="0">
+                <a:solidFill>
+                  <a:srgbClr val="FF0000"/>
+                </a:solidFill>
+                <a:latin typeface="Lucida Sans Typewriter" panose="020B0509030504030204" pitchFamily="49" charset="0"/>
+                <a:cs typeface="Arial" panose="020B0604020202020204" pitchFamily="34" charset="0"/>
+              </a:rPr>
               <a:t>minutes</a:t>
             </a:r>
             <a:endParaRPr lang="en-AU" dirty="0" smtClean="0">
@@ -9465,118 +9211,6 @@
                 <a:cs typeface="Arial" panose="020B0604020202020204" pitchFamily="34" charset="0"/>
               </a:rPr>
               <a:t>  - login to the virtual machine </a:t>
-            </a:r>
-          </a:p>
-          <a:p>
-            <a:pPr marL="742950" lvl="1" indent="-285750">
-              <a:buFont typeface="Wingdings" panose="05000000000000000000" pitchFamily="2" charset="2"/>
-              <a:buChar char="Ø"/>
-            </a:pPr>
-            <a:r>
-              <a:rPr lang="en-AU" dirty="0" smtClean="0">
-                <a:latin typeface="Lucida Sans Typewriter" panose="020B0509030504030204" pitchFamily="49" charset="0"/>
-                <a:cs typeface="Arial" panose="020B0604020202020204" pitchFamily="34" charset="0"/>
-              </a:rPr>
-              <a:t>vagrant </a:t>
-            </a:r>
-            <a:r>
-              <a:rPr lang="en-AU" dirty="0" err="1" smtClean="0">
-                <a:latin typeface="Lucida Sans Typewriter" panose="020B0509030504030204" pitchFamily="49" charset="0"/>
-                <a:cs typeface="Arial" panose="020B0604020202020204" pitchFamily="34" charset="0"/>
-              </a:rPr>
-              <a:t>ssh</a:t>
-            </a:r>
-            <a:endParaRPr lang="en-AU" dirty="0" smtClean="0">
-              <a:latin typeface="Lucida Sans Typewriter" panose="020B0509030504030204" pitchFamily="49" charset="0"/>
-              <a:cs typeface="Arial" panose="020B0604020202020204" pitchFamily="34" charset="0"/>
-            </a:endParaRPr>
-          </a:p>
-          <a:p>
-            <a:r>
-              <a:rPr lang="en-AU" dirty="0" smtClean="0">
-                <a:solidFill>
-                  <a:srgbClr val="FFFF00"/>
-                </a:solidFill>
-                <a:latin typeface="Arial" panose="020B0604020202020204" pitchFamily="34" charset="0"/>
-                <a:cs typeface="Arial" panose="020B0604020202020204" pitchFamily="34" charset="0"/>
-              </a:rPr>
-              <a:t>Step 4a  </a:t>
-            </a:r>
-            <a:r>
-              <a:rPr lang="en-AU" dirty="0" smtClean="0">
-                <a:latin typeface="Arial" panose="020B0604020202020204" pitchFamily="34" charset="0"/>
-                <a:cs typeface="Arial" panose="020B0604020202020204" pitchFamily="34" charset="0"/>
-              </a:rPr>
-              <a:t>- run the setup command</a:t>
-            </a:r>
-          </a:p>
-          <a:p>
-            <a:pPr marL="742950" lvl="1" indent="-285750">
-              <a:buFont typeface="Wingdings" panose="05000000000000000000" pitchFamily="2" charset="2"/>
-              <a:buChar char="Ø"/>
-            </a:pPr>
-            <a:r>
-              <a:rPr lang="en-AU" dirty="0" smtClean="0">
-                <a:latin typeface="Lucida Sans Typewriter" panose="020B0509030504030204" pitchFamily="49" charset="0"/>
-                <a:cs typeface="Arial" panose="020B0604020202020204" pitchFamily="34" charset="0"/>
-              </a:rPr>
-              <a:t>./</a:t>
-            </a:r>
-            <a:r>
-              <a:rPr lang="en-AU" dirty="0" smtClean="0">
-                <a:latin typeface="Lucida Sans Typewriter" panose="020B0509030504030204" pitchFamily="49" charset="0"/>
-                <a:cs typeface="Arial" panose="020B0604020202020204" pitchFamily="34" charset="0"/>
-              </a:rPr>
-              <a:t>setup.sh     </a:t>
-            </a:r>
-            <a:r>
-              <a:rPr lang="en-AU" dirty="0" smtClean="0">
-                <a:solidFill>
-                  <a:srgbClr val="FF0000"/>
-                </a:solidFill>
-                <a:latin typeface="Lucida Sans Typewriter" panose="020B0509030504030204" pitchFamily="49" charset="0"/>
-                <a:cs typeface="Arial" panose="020B0604020202020204" pitchFamily="34" charset="0"/>
-              </a:rPr>
-              <a:t>---- note this can take up to 30 minutes</a:t>
-            </a:r>
-            <a:endParaRPr lang="en-AU" dirty="0" smtClean="0">
-              <a:solidFill>
-                <a:srgbClr val="FF0000"/>
-              </a:solidFill>
-              <a:latin typeface="Lucida Sans Typewriter" panose="020B0509030504030204" pitchFamily="49" charset="0"/>
-              <a:cs typeface="Arial" panose="020B0604020202020204" pitchFamily="34" charset="0"/>
-            </a:endParaRPr>
-          </a:p>
-          <a:p>
-            <a:r>
-              <a:rPr lang="en-AU" dirty="0" smtClean="0">
-                <a:solidFill>
-                  <a:srgbClr val="FFFF00"/>
-                </a:solidFill>
-                <a:latin typeface="Arial" panose="020B0604020202020204" pitchFamily="34" charset="0"/>
-                <a:cs typeface="Arial" panose="020B0604020202020204" pitchFamily="34" charset="0"/>
-              </a:rPr>
-              <a:t>Step 4b </a:t>
-            </a:r>
-            <a:r>
-              <a:rPr lang="en-AU" dirty="0" smtClean="0">
-                <a:latin typeface="Arial" panose="020B0604020202020204" pitchFamily="34" charset="0"/>
-                <a:cs typeface="Arial" panose="020B0604020202020204" pitchFamily="34" charset="0"/>
-              </a:rPr>
-              <a:t>– initialize the environment permanently.</a:t>
-            </a:r>
-          </a:p>
-          <a:p>
-            <a:pPr marL="742950" lvl="1" indent="-285750">
-              <a:buFont typeface="Wingdings" panose="05000000000000000000" pitchFamily="2" charset="2"/>
-              <a:buChar char="Ø"/>
-            </a:pPr>
-            <a:r>
-              <a:rPr lang="en-AU" dirty="0" smtClean="0">
-                <a:latin typeface="Lucida Sans Typewriter" panose="020B0509030504030204" pitchFamily="49" charset="0"/>
-                <a:cs typeface="Arial" panose="020B0604020202020204" pitchFamily="34" charset="0"/>
-              </a:rPr>
-              <a:t>Exit  (or ctrl-d)</a:t>
             </a:r>
           </a:p>
           <a:p>
@@ -10151,18 +9785,18 @@
 </file>
 
 <file path=customXml/item1.xml><?xml version="1.0" encoding="utf-8"?>
+<p:properties xmlns:p="http://schemas.microsoft.com/office/2006/metadata/properties" xmlns:xsi="http://www.w3.org/2001/XMLSchema-instance" xmlns:pc="http://schemas.microsoft.com/office/infopath/2007/PartnerControls">
+  <documentManagement/>
+</p:properties>
+</file>
+
+<file path=customXml/item2.xml><?xml version="1.0" encoding="utf-8"?>
 <?mso-contentType ?>
 <FormTemplates xmlns="http://schemas.microsoft.com/sharepoint/v3/contenttype/forms">
   <Display>DocumentLibraryForm</Display>
   <Edit>DocumentLibraryForm</Edit>
   <New>DocumentLibraryForm</New>
 </FormTemplates>
-</file>
-
-<file path=customXml/item2.xml><?xml version="1.0" encoding="utf-8"?>
-<p:properties xmlns:p="http://schemas.microsoft.com/office/2006/metadata/properties" xmlns:xsi="http://www.w3.org/2001/XMLSchema-instance" xmlns:pc="http://schemas.microsoft.com/office/infopath/2007/PartnerControls">
-  <documentManagement/>
-</p:properties>
 </file>
 
 <file path=customXml/item3.xml><?xml version="1.0" encoding="utf-8"?>
@@ -10351,14 +9985,6 @@
 </file>
 
 <file path=customXml/itemProps1.xml><?xml version="1.0" encoding="utf-8"?>
-<ds:datastoreItem xmlns:ds="http://schemas.openxmlformats.org/officeDocument/2006/customXml" ds:itemID="{10127F0B-EA07-4AFF-8549-55D4D4284DC4}">
-  <ds:schemaRefs>
-    <ds:schemaRef ds:uri="http://schemas.microsoft.com/sharepoint/v3/contenttype/forms"/>
-  </ds:schemaRefs>
-</ds:datastoreItem>
-</file>
-
-<file path=customXml/itemProps2.xml><?xml version="1.0" encoding="utf-8"?>
 <ds:datastoreItem xmlns:ds="http://schemas.openxmlformats.org/officeDocument/2006/customXml" ds:itemID="{DC2CE541-9384-4F78-A2DC-081CEDD5EAE8}">
   <ds:schemaRefs>
     <ds:schemaRef ds:uri="http://purl.org/dc/terms/"/>
@@ -10371,6 +9997,14 @@
     <ds:schemaRef ds:uri="45fda36c-df07-4f55-9922-29409b58d9d3"/>
     <ds:schemaRef ds:uri="http://www.w3.org/XML/1998/namespace"/>
     <ds:schemaRef ds:uri="http://purl.org/dc/dcmitype/"/>
+  </ds:schemaRefs>
+</ds:datastoreItem>
+</file>
+
+<file path=customXml/itemProps2.xml><?xml version="1.0" encoding="utf-8"?>
+<ds:datastoreItem xmlns:ds="http://schemas.openxmlformats.org/officeDocument/2006/customXml" ds:itemID="{10127F0B-EA07-4AFF-8549-55D4D4284DC4}">
+  <ds:schemaRefs>
+    <ds:schemaRef ds:uri="http://schemas.microsoft.com/sharepoint/v3/contenttype/forms"/>
   </ds:schemaRefs>
 </ds:datastoreItem>
 </file>

</xml_diff>